<commit_message>
desisti de fazer a modulação para psk >=16 bits. adicionei mais infos ao slide
</commit_message>
<xml_diff>
--- a/COMUNICAÇÕES DIGITAIS.pptx
+++ b/COMUNICAÇÕES DIGITAIS.pptx
@@ -7,11 +7,14 @@
   <p:sldIdLst>
     <p:sldId id="256" r:id="rId2"/>
     <p:sldId id="259" r:id="rId3"/>
-    <p:sldId id="260" r:id="rId4"/>
-    <p:sldId id="261" r:id="rId5"/>
-    <p:sldId id="262" r:id="rId6"/>
-    <p:sldId id="263" r:id="rId7"/>
-    <p:sldId id="264" r:id="rId8"/>
+    <p:sldId id="265" r:id="rId4"/>
+    <p:sldId id="260" r:id="rId5"/>
+    <p:sldId id="261" r:id="rId6"/>
+    <p:sldId id="262" r:id="rId7"/>
+    <p:sldId id="263" r:id="rId8"/>
+    <p:sldId id="264" r:id="rId9"/>
+    <p:sldId id="266" r:id="rId10"/>
+    <p:sldId id="267" r:id="rId11"/>
   </p:sldIdLst>
   <p:sldSz cx="9144000" cy="6858000" type="screen4x3"/>
   <p:notesSz cx="6858000" cy="9144000"/>
@@ -110,6 +113,22 @@
       </a:defRPr>
     </a:lvl9pPr>
   </p:defaultTextStyle>
+  <p:extLst>
+    <p:ext uri="{EFAFB233-063F-42B5-8137-9DF3F51BA10A}">
+      <p15:sldGuideLst xmlns:p15="http://schemas.microsoft.com/office/powerpoint/2012/main">
+        <p15:guide id="1" orient="horz" pos="2160">
+          <p15:clr>
+            <a:srgbClr val="A4A3A4"/>
+          </p15:clr>
+        </p15:guide>
+        <p15:guide id="2" pos="2880">
+          <p15:clr>
+            <a:srgbClr val="A4A3A4"/>
+          </p15:clr>
+        </p15:guide>
+      </p15:sldGuideLst>
+    </p:ext>
+  </p:extLst>
 </p:presentation>
 </file>
 
@@ -2914,7 +2933,7 @@
           <a:p>
             <a:fld id="{882996C7-DA72-484F-80C9-86425D46391B}" type="datetimeFigureOut">
               <a:rPr lang="pt-BR" smtClean="0"/>
-              <a:t>04/10/2016</a:t>
+              <a:t>05/10/2016</a:t>
             </a:fld>
             <a:endParaRPr lang="pt-BR"/>
           </a:p>
@@ -2956,7 +2975,7 @@
           <a:p>
             <a:fld id="{2F9841CC-682E-4043-A1C1-95A841BBAAAC}" type="slidenum">
               <a:rPr lang="pt-BR" smtClean="0"/>
-              <a:t>‹nº›</a:t>
+              <a:t>‹#›</a:t>
             </a:fld>
             <a:endParaRPr lang="pt-BR"/>
           </a:p>
@@ -3184,7 +3203,7 @@
           </a:lstStyle>
           <a:p>
             <a:r>
-              <a:rPr lang="pt-BR" smtClean="0"/>
+              <a:rPr lang="pt-BR"/>
               <a:t>Clique para editar o título mestre</a:t>
             </a:r>
             <a:endParaRPr lang="en-US" dirty="0"/>
@@ -3303,7 +3322,7 @@
           </a:lstStyle>
           <a:p>
             <a:r>
-              <a:rPr lang="pt-BR" smtClean="0"/>
+              <a:rPr lang="pt-BR"/>
               <a:t>Clique para editar o estilo do subtítulo mestre</a:t>
             </a:r>
             <a:endParaRPr lang="en-US" dirty="0"/>
@@ -3351,7 +3370,7 @@
           <a:lstStyle/>
           <a:p>
             <a:r>
-              <a:rPr lang="pt-BR" smtClean="0"/>
+              <a:rPr lang="pt-BR"/>
               <a:t>Clique para editar o título mestre</a:t>
             </a:r>
             <a:endParaRPr lang="en-US"/>
@@ -3375,35 +3394,35 @@
           <a:p>
             <a:pPr lvl="0"/>
             <a:r>
-              <a:rPr lang="pt-BR" smtClean="0"/>
+              <a:rPr lang="pt-BR"/>
               <a:t>Clique para editar o texto mestre</a:t>
             </a:r>
           </a:p>
           <a:p>
             <a:pPr lvl="1"/>
             <a:r>
-              <a:rPr lang="pt-BR" smtClean="0"/>
+              <a:rPr lang="pt-BR"/>
               <a:t>Segundo nível</a:t>
             </a:r>
           </a:p>
           <a:p>
             <a:pPr lvl="2"/>
             <a:r>
-              <a:rPr lang="pt-BR" smtClean="0"/>
+              <a:rPr lang="pt-BR"/>
               <a:t>Terceiro nível</a:t>
             </a:r>
           </a:p>
           <a:p>
             <a:pPr lvl="3"/>
             <a:r>
-              <a:rPr lang="pt-BR" smtClean="0"/>
+              <a:rPr lang="pt-BR"/>
               <a:t>Quarto nível</a:t>
             </a:r>
           </a:p>
           <a:p>
             <a:pPr lvl="4"/>
             <a:r>
-              <a:rPr lang="pt-BR" smtClean="0"/>
+              <a:rPr lang="pt-BR"/>
               <a:t>Quinto nível</a:t>
             </a:r>
             <a:endParaRPr lang="en-US"/>
@@ -3427,7 +3446,7 @@
           <a:p>
             <a:fld id="{882996C7-DA72-484F-80C9-86425D46391B}" type="datetimeFigureOut">
               <a:rPr lang="pt-BR" smtClean="0"/>
-              <a:t>04/10/2016</a:t>
+              <a:t>05/10/2016</a:t>
             </a:fld>
             <a:endParaRPr lang="pt-BR"/>
           </a:p>
@@ -3469,7 +3488,7 @@
           <a:p>
             <a:fld id="{2F9841CC-682E-4043-A1C1-95A841BBAAAC}" type="slidenum">
               <a:rPr lang="pt-BR" smtClean="0"/>
-              <a:t>‹nº›</a:t>
+              <a:t>‹#›</a:t>
             </a:fld>
             <a:endParaRPr lang="pt-BR"/>
           </a:p>
@@ -3521,7 +3540,7 @@
           <a:lstStyle/>
           <a:p>
             <a:r>
-              <a:rPr lang="pt-BR" smtClean="0"/>
+              <a:rPr lang="pt-BR"/>
               <a:t>Clique para editar o título mestre</a:t>
             </a:r>
             <a:endParaRPr lang="en-US"/>
@@ -3550,35 +3569,35 @@
           <a:p>
             <a:pPr lvl="0"/>
             <a:r>
-              <a:rPr lang="pt-BR" smtClean="0"/>
+              <a:rPr lang="pt-BR"/>
               <a:t>Clique para editar o texto mestre</a:t>
             </a:r>
           </a:p>
           <a:p>
             <a:pPr lvl="1"/>
             <a:r>
-              <a:rPr lang="pt-BR" smtClean="0"/>
+              <a:rPr lang="pt-BR"/>
               <a:t>Segundo nível</a:t>
             </a:r>
           </a:p>
           <a:p>
             <a:pPr lvl="2"/>
             <a:r>
-              <a:rPr lang="pt-BR" smtClean="0"/>
+              <a:rPr lang="pt-BR"/>
               <a:t>Terceiro nível</a:t>
             </a:r>
           </a:p>
           <a:p>
             <a:pPr lvl="3"/>
             <a:r>
-              <a:rPr lang="pt-BR" smtClean="0"/>
+              <a:rPr lang="pt-BR"/>
               <a:t>Quarto nível</a:t>
             </a:r>
           </a:p>
           <a:p>
             <a:pPr lvl="4"/>
             <a:r>
-              <a:rPr lang="pt-BR" smtClean="0"/>
+              <a:rPr lang="pt-BR"/>
               <a:t>Quinto nível</a:t>
             </a:r>
             <a:endParaRPr lang="en-US"/>
@@ -3602,7 +3621,7 @@
           <a:p>
             <a:fld id="{882996C7-DA72-484F-80C9-86425D46391B}" type="datetimeFigureOut">
               <a:rPr lang="pt-BR" smtClean="0"/>
-              <a:t>04/10/2016</a:t>
+              <a:t>05/10/2016</a:t>
             </a:fld>
             <a:endParaRPr lang="pt-BR"/>
           </a:p>
@@ -3644,7 +3663,7 @@
           <a:p>
             <a:fld id="{2F9841CC-682E-4043-A1C1-95A841BBAAAC}" type="slidenum">
               <a:rPr lang="pt-BR" smtClean="0"/>
-              <a:t>‹nº›</a:t>
+              <a:t>‹#›</a:t>
             </a:fld>
             <a:endParaRPr lang="pt-BR"/>
           </a:p>
@@ -3691,7 +3710,7 @@
           <a:lstStyle/>
           <a:p>
             <a:r>
-              <a:rPr lang="pt-BR" smtClean="0"/>
+              <a:rPr lang="pt-BR"/>
               <a:t>Clique para editar o título mestre</a:t>
             </a:r>
             <a:endParaRPr lang="en-US" dirty="0"/>
@@ -3715,35 +3734,35 @@
           <a:p>
             <a:pPr lvl="0"/>
             <a:r>
-              <a:rPr lang="pt-BR" smtClean="0"/>
+              <a:rPr lang="pt-BR"/>
               <a:t>Clique para editar o texto mestre</a:t>
             </a:r>
           </a:p>
           <a:p>
             <a:pPr lvl="1"/>
             <a:r>
-              <a:rPr lang="pt-BR" smtClean="0"/>
+              <a:rPr lang="pt-BR"/>
               <a:t>Segundo nível</a:t>
             </a:r>
           </a:p>
           <a:p>
             <a:pPr lvl="2"/>
             <a:r>
-              <a:rPr lang="pt-BR" smtClean="0"/>
+              <a:rPr lang="pt-BR"/>
               <a:t>Terceiro nível</a:t>
             </a:r>
           </a:p>
           <a:p>
             <a:pPr lvl="3"/>
             <a:r>
-              <a:rPr lang="pt-BR" smtClean="0"/>
+              <a:rPr lang="pt-BR"/>
               <a:t>Quarto nível</a:t>
             </a:r>
           </a:p>
           <a:p>
             <a:pPr lvl="4"/>
             <a:r>
-              <a:rPr lang="pt-BR" smtClean="0"/>
+              <a:rPr lang="pt-BR"/>
               <a:t>Quinto nível</a:t>
             </a:r>
             <a:endParaRPr lang="en-US"/>
@@ -3767,7 +3786,7 @@
           <a:p>
             <a:fld id="{882996C7-DA72-484F-80C9-86425D46391B}" type="datetimeFigureOut">
               <a:rPr lang="pt-BR" smtClean="0"/>
-              <a:t>04/10/2016</a:t>
+              <a:t>05/10/2016</a:t>
             </a:fld>
             <a:endParaRPr lang="pt-BR"/>
           </a:p>
@@ -3809,7 +3828,7 @@
           <a:p>
             <a:fld id="{2F9841CC-682E-4043-A1C1-95A841BBAAAC}" type="slidenum">
               <a:rPr lang="pt-BR" smtClean="0"/>
-              <a:t>‹nº›</a:t>
+              <a:t>‹#›</a:t>
             </a:fld>
             <a:endParaRPr lang="pt-BR"/>
           </a:p>
@@ -6840,7 +6859,7 @@
           <a:p>
             <a:pPr lvl="0"/>
             <a:r>
-              <a:rPr lang="pt-BR" smtClean="0"/>
+              <a:rPr lang="pt-BR"/>
               <a:t>Clique para editar o texto mestre</a:t>
             </a:r>
           </a:p>
@@ -6867,7 +6886,7 @@
           <a:lstStyle/>
           <a:p>
             <a:r>
-              <a:rPr lang="pt-BR" smtClean="0"/>
+              <a:rPr lang="pt-BR"/>
               <a:t>Clique para editar o título mestre</a:t>
             </a:r>
             <a:endParaRPr lang="en-US"/>
@@ -6891,7 +6910,7 @@
           <a:p>
             <a:fld id="{882996C7-DA72-484F-80C9-86425D46391B}" type="datetimeFigureOut">
               <a:rPr lang="pt-BR" smtClean="0"/>
-              <a:t>04/10/2016</a:t>
+              <a:t>05/10/2016</a:t>
             </a:fld>
             <a:endParaRPr lang="pt-BR"/>
           </a:p>
@@ -6933,7 +6952,7 @@
           <a:p>
             <a:fld id="{2F9841CC-682E-4043-A1C1-95A841BBAAAC}" type="slidenum">
               <a:rPr lang="pt-BR" smtClean="0"/>
-              <a:t>‹nº›</a:t>
+              <a:t>‹#›</a:t>
             </a:fld>
             <a:endParaRPr lang="pt-BR"/>
           </a:p>
@@ -6980,7 +6999,7 @@
           <a:lstStyle/>
           <a:p>
             <a:r>
-              <a:rPr lang="pt-BR" smtClean="0"/>
+              <a:rPr lang="pt-BR"/>
               <a:t>Clique para editar o título mestre</a:t>
             </a:r>
             <a:endParaRPr lang="en-US"/>
@@ -7037,35 +7056,35 @@
           <a:p>
             <a:pPr lvl="0"/>
             <a:r>
-              <a:rPr lang="pt-BR" smtClean="0"/>
+              <a:rPr lang="pt-BR"/>
               <a:t>Clique para editar o texto mestre</a:t>
             </a:r>
           </a:p>
           <a:p>
             <a:pPr lvl="1"/>
             <a:r>
-              <a:rPr lang="pt-BR" smtClean="0"/>
+              <a:rPr lang="pt-BR"/>
               <a:t>Segundo nível</a:t>
             </a:r>
           </a:p>
           <a:p>
             <a:pPr lvl="2"/>
             <a:r>
-              <a:rPr lang="pt-BR" smtClean="0"/>
+              <a:rPr lang="pt-BR"/>
               <a:t>Terceiro nível</a:t>
             </a:r>
           </a:p>
           <a:p>
             <a:pPr lvl="3"/>
             <a:r>
-              <a:rPr lang="pt-BR" smtClean="0"/>
+              <a:rPr lang="pt-BR"/>
               <a:t>Quarto nível</a:t>
             </a:r>
           </a:p>
           <a:p>
             <a:pPr lvl="4"/>
             <a:r>
-              <a:rPr lang="pt-BR" smtClean="0"/>
+              <a:rPr lang="pt-BR"/>
               <a:t>Quinto nível</a:t>
             </a:r>
             <a:endParaRPr lang="en-US"/>
@@ -7122,35 +7141,35 @@
           <a:p>
             <a:pPr lvl="0"/>
             <a:r>
-              <a:rPr lang="pt-BR" smtClean="0"/>
+              <a:rPr lang="pt-BR"/>
               <a:t>Clique para editar o texto mestre</a:t>
             </a:r>
           </a:p>
           <a:p>
             <a:pPr lvl="1"/>
             <a:r>
-              <a:rPr lang="pt-BR" smtClean="0"/>
+              <a:rPr lang="pt-BR"/>
               <a:t>Segundo nível</a:t>
             </a:r>
           </a:p>
           <a:p>
             <a:pPr lvl="2"/>
             <a:r>
-              <a:rPr lang="pt-BR" smtClean="0"/>
+              <a:rPr lang="pt-BR"/>
               <a:t>Terceiro nível</a:t>
             </a:r>
           </a:p>
           <a:p>
             <a:pPr lvl="3"/>
             <a:r>
-              <a:rPr lang="pt-BR" smtClean="0"/>
+              <a:rPr lang="pt-BR"/>
               <a:t>Quarto nível</a:t>
             </a:r>
           </a:p>
           <a:p>
             <a:pPr lvl="4"/>
             <a:r>
-              <a:rPr lang="pt-BR" smtClean="0"/>
+              <a:rPr lang="pt-BR"/>
               <a:t>Quinto nível</a:t>
             </a:r>
             <a:endParaRPr lang="en-US"/>
@@ -7174,7 +7193,7 @@
           <a:p>
             <a:fld id="{882996C7-DA72-484F-80C9-86425D46391B}" type="datetimeFigureOut">
               <a:rPr lang="pt-BR" smtClean="0"/>
-              <a:t>04/10/2016</a:t>
+              <a:t>05/10/2016</a:t>
             </a:fld>
             <a:endParaRPr lang="pt-BR"/>
           </a:p>
@@ -7216,7 +7235,7 @@
           <a:p>
             <a:fld id="{2F9841CC-682E-4043-A1C1-95A841BBAAAC}" type="slidenum">
               <a:rPr lang="pt-BR" smtClean="0"/>
-              <a:t>‹nº›</a:t>
+              <a:t>‹#›</a:t>
             </a:fld>
             <a:endParaRPr lang="pt-BR"/>
           </a:p>
@@ -7267,7 +7286,7 @@
           </a:lstStyle>
           <a:p>
             <a:r>
-              <a:rPr lang="pt-BR" smtClean="0"/>
+              <a:rPr lang="pt-BR"/>
               <a:t>Clique para editar o título mestre</a:t>
             </a:r>
             <a:endParaRPr lang="en-US"/>
@@ -7333,7 +7352,7 @@
           <a:p>
             <a:pPr lvl="0"/>
             <a:r>
-              <a:rPr lang="pt-BR" smtClean="0"/>
+              <a:rPr lang="pt-BR"/>
               <a:t>Clique para editar o texto mestre</a:t>
             </a:r>
           </a:p>
@@ -7389,35 +7408,35 @@
           <a:p>
             <a:pPr lvl="0"/>
             <a:r>
-              <a:rPr lang="pt-BR" smtClean="0"/>
+              <a:rPr lang="pt-BR"/>
               <a:t>Clique para editar o texto mestre</a:t>
             </a:r>
           </a:p>
           <a:p>
             <a:pPr lvl="1"/>
             <a:r>
-              <a:rPr lang="pt-BR" smtClean="0"/>
+              <a:rPr lang="pt-BR"/>
               <a:t>Segundo nível</a:t>
             </a:r>
           </a:p>
           <a:p>
             <a:pPr lvl="2"/>
             <a:r>
-              <a:rPr lang="pt-BR" smtClean="0"/>
+              <a:rPr lang="pt-BR"/>
               <a:t>Terceiro nível</a:t>
             </a:r>
           </a:p>
           <a:p>
             <a:pPr lvl="3"/>
             <a:r>
-              <a:rPr lang="pt-BR" smtClean="0"/>
+              <a:rPr lang="pt-BR"/>
               <a:t>Quarto nível</a:t>
             </a:r>
           </a:p>
           <a:p>
             <a:pPr lvl="4"/>
             <a:r>
-              <a:rPr lang="pt-BR" smtClean="0"/>
+              <a:rPr lang="pt-BR"/>
               <a:t>Quinto nível</a:t>
             </a:r>
             <a:endParaRPr lang="en-US"/>
@@ -7483,7 +7502,7 @@
           <a:p>
             <a:pPr lvl="0"/>
             <a:r>
-              <a:rPr lang="pt-BR" smtClean="0"/>
+              <a:rPr lang="pt-BR"/>
               <a:t>Clique para editar o texto mestre</a:t>
             </a:r>
           </a:p>
@@ -7539,35 +7558,35 @@
           <a:p>
             <a:pPr lvl="0"/>
             <a:r>
-              <a:rPr lang="pt-BR" smtClean="0"/>
+              <a:rPr lang="pt-BR"/>
               <a:t>Clique para editar o texto mestre</a:t>
             </a:r>
           </a:p>
           <a:p>
             <a:pPr lvl="1"/>
             <a:r>
-              <a:rPr lang="pt-BR" smtClean="0"/>
+              <a:rPr lang="pt-BR"/>
               <a:t>Segundo nível</a:t>
             </a:r>
           </a:p>
           <a:p>
             <a:pPr lvl="2"/>
             <a:r>
-              <a:rPr lang="pt-BR" smtClean="0"/>
+              <a:rPr lang="pt-BR"/>
               <a:t>Terceiro nível</a:t>
             </a:r>
           </a:p>
           <a:p>
             <a:pPr lvl="3"/>
             <a:r>
-              <a:rPr lang="pt-BR" smtClean="0"/>
+              <a:rPr lang="pt-BR"/>
               <a:t>Quarto nível</a:t>
             </a:r>
           </a:p>
           <a:p>
             <a:pPr lvl="4"/>
             <a:r>
-              <a:rPr lang="pt-BR" smtClean="0"/>
+              <a:rPr lang="pt-BR"/>
               <a:t>Quinto nível</a:t>
             </a:r>
             <a:endParaRPr lang="en-US"/>
@@ -7591,7 +7610,7 @@
           <a:p>
             <a:fld id="{882996C7-DA72-484F-80C9-86425D46391B}" type="datetimeFigureOut">
               <a:rPr lang="pt-BR" smtClean="0"/>
-              <a:t>04/10/2016</a:t>
+              <a:t>05/10/2016</a:t>
             </a:fld>
             <a:endParaRPr lang="pt-BR"/>
           </a:p>
@@ -7633,7 +7652,7 @@
           <a:p>
             <a:fld id="{2F9841CC-682E-4043-A1C1-95A841BBAAAC}" type="slidenum">
               <a:rPr lang="pt-BR" smtClean="0"/>
-              <a:t>‹nº›</a:t>
+              <a:t>‹#›</a:t>
             </a:fld>
             <a:endParaRPr lang="pt-BR"/>
           </a:p>
@@ -7680,7 +7699,7 @@
           <a:lstStyle/>
           <a:p>
             <a:r>
-              <a:rPr lang="pt-BR" smtClean="0"/>
+              <a:rPr lang="pt-BR"/>
               <a:t>Clique para editar o título mestre</a:t>
             </a:r>
             <a:endParaRPr lang="en-US"/>
@@ -7704,7 +7723,7 @@
           <a:p>
             <a:fld id="{882996C7-DA72-484F-80C9-86425D46391B}" type="datetimeFigureOut">
               <a:rPr lang="pt-BR" smtClean="0"/>
-              <a:t>04/10/2016</a:t>
+              <a:t>05/10/2016</a:t>
             </a:fld>
             <a:endParaRPr lang="pt-BR"/>
           </a:p>
@@ -7746,7 +7765,7 @@
           <a:p>
             <a:fld id="{2F9841CC-682E-4043-A1C1-95A841BBAAAC}" type="slidenum">
               <a:rPr lang="pt-BR" smtClean="0"/>
-              <a:t>‹nº›</a:t>
+              <a:t>‹#›</a:t>
             </a:fld>
             <a:endParaRPr lang="pt-BR"/>
           </a:p>
@@ -7794,7 +7813,7 @@
           <a:p>
             <a:fld id="{882996C7-DA72-484F-80C9-86425D46391B}" type="datetimeFigureOut">
               <a:rPr lang="pt-BR" smtClean="0"/>
-              <a:t>04/10/2016</a:t>
+              <a:t>05/10/2016</a:t>
             </a:fld>
             <a:endParaRPr lang="pt-BR"/>
           </a:p>
@@ -7836,7 +7855,7 @@
           <a:p>
             <a:fld id="{2F9841CC-682E-4043-A1C1-95A841BBAAAC}" type="slidenum">
               <a:rPr lang="pt-BR" smtClean="0"/>
-              <a:t>‹nº›</a:t>
+              <a:t>‹#›</a:t>
             </a:fld>
             <a:endParaRPr lang="pt-BR"/>
           </a:p>
@@ -7917,35 +7936,35 @@
           <a:p>
             <a:pPr lvl="0"/>
             <a:r>
-              <a:rPr lang="pt-BR" smtClean="0"/>
+              <a:rPr lang="pt-BR"/>
               <a:t>Clique para editar o texto mestre</a:t>
             </a:r>
           </a:p>
           <a:p>
             <a:pPr lvl="1"/>
             <a:r>
-              <a:rPr lang="pt-BR" smtClean="0"/>
+              <a:rPr lang="pt-BR"/>
               <a:t>Segundo nível</a:t>
             </a:r>
           </a:p>
           <a:p>
             <a:pPr lvl="2"/>
             <a:r>
-              <a:rPr lang="pt-BR" smtClean="0"/>
+              <a:rPr lang="pt-BR"/>
               <a:t>Terceiro nível</a:t>
             </a:r>
           </a:p>
           <a:p>
             <a:pPr lvl="3"/>
             <a:r>
-              <a:rPr lang="pt-BR" smtClean="0"/>
+              <a:rPr lang="pt-BR"/>
               <a:t>Quarto nível</a:t>
             </a:r>
           </a:p>
           <a:p>
             <a:pPr lvl="4"/>
             <a:r>
-              <a:rPr lang="pt-BR" smtClean="0"/>
+              <a:rPr lang="pt-BR"/>
               <a:t>Quinto nível</a:t>
             </a:r>
             <a:endParaRPr lang="en-US" dirty="0"/>
@@ -7969,7 +7988,7 @@
           <a:p>
             <a:fld id="{882996C7-DA72-484F-80C9-86425D46391B}" type="datetimeFigureOut">
               <a:rPr lang="pt-BR" smtClean="0"/>
-              <a:t>04/10/2016</a:t>
+              <a:t>05/10/2016</a:t>
             </a:fld>
             <a:endParaRPr lang="pt-BR"/>
           </a:p>
@@ -8011,7 +8030,7 @@
           <a:p>
             <a:fld id="{2F9841CC-682E-4043-A1C1-95A841BBAAAC}" type="slidenum">
               <a:rPr lang="pt-BR" smtClean="0"/>
-              <a:t>‹nº›</a:t>
+              <a:t>‹#›</a:t>
             </a:fld>
             <a:endParaRPr lang="pt-BR"/>
           </a:p>
@@ -8242,7 +8261,7 @@
           </a:lstStyle>
           <a:p>
             <a:r>
-              <a:rPr lang="pt-BR" smtClean="0"/>
+              <a:rPr lang="pt-BR"/>
               <a:t>Clique para editar o título mestre</a:t>
             </a:r>
             <a:endParaRPr lang="en-US" dirty="0"/>
@@ -8314,7 +8333,7 @@
           <a:p>
             <a:pPr lvl="0"/>
             <a:r>
-              <a:rPr lang="pt-BR" smtClean="0"/>
+              <a:rPr lang="pt-BR"/>
               <a:t>Clique para editar o texto mestre</a:t>
             </a:r>
           </a:p>
@@ -8431,7 +8450,7 @@
           </a:lstStyle>
           <a:p>
             <a:r>
-              <a:rPr lang="pt-BR" smtClean="0"/>
+              <a:rPr lang="pt-BR"/>
               <a:t>Clique no ícone para adicionar uma imagem</a:t>
             </a:r>
             <a:endParaRPr lang="en-US"/>
@@ -8455,7 +8474,7 @@
           <a:p>
             <a:fld id="{882996C7-DA72-484F-80C9-86425D46391B}" type="datetimeFigureOut">
               <a:rPr lang="pt-BR" smtClean="0"/>
-              <a:t>04/10/2016</a:t>
+              <a:t>05/10/2016</a:t>
             </a:fld>
             <a:endParaRPr lang="pt-BR"/>
           </a:p>
@@ -8497,7 +8516,7 @@
           <a:p>
             <a:fld id="{2F9841CC-682E-4043-A1C1-95A841BBAAAC}" type="slidenum">
               <a:rPr lang="pt-BR" smtClean="0"/>
-              <a:t>‹nº›</a:t>
+              <a:t>‹#›</a:t>
             </a:fld>
             <a:endParaRPr lang="pt-BR"/>
           </a:p>
@@ -8718,7 +8737,7 @@
           </a:lstStyle>
           <a:p>
             <a:r>
-              <a:rPr lang="pt-BR" smtClean="0"/>
+              <a:rPr lang="pt-BR"/>
               <a:t>Clique para editar o título mestre</a:t>
             </a:r>
             <a:endParaRPr lang="en-US" dirty="0"/>
@@ -8790,7 +8809,7 @@
           <a:p>
             <a:pPr lvl="0"/>
             <a:r>
-              <a:rPr lang="pt-BR" smtClean="0"/>
+              <a:rPr lang="pt-BR"/>
               <a:t>Clique para editar o texto mestre</a:t>
             </a:r>
           </a:p>
@@ -8905,7 +8924,7 @@
           <a:lstStyle/>
           <a:p>
             <a:r>
-              <a:rPr lang="pt-BR" smtClean="0"/>
+              <a:rPr lang="pt-BR"/>
               <a:t>Clique para editar o título mestre</a:t>
             </a:r>
             <a:endParaRPr lang="en-US" dirty="0"/>
@@ -8939,35 +8958,35 @@
           <a:p>
             <a:pPr lvl="0"/>
             <a:r>
-              <a:rPr lang="pt-BR" smtClean="0"/>
+              <a:rPr lang="pt-BR"/>
               <a:t>Clique para editar o texto mestre</a:t>
             </a:r>
           </a:p>
           <a:p>
             <a:pPr lvl="1"/>
             <a:r>
-              <a:rPr lang="pt-BR" smtClean="0"/>
+              <a:rPr lang="pt-BR"/>
               <a:t>Segundo nível</a:t>
             </a:r>
           </a:p>
           <a:p>
             <a:pPr lvl="2"/>
             <a:r>
-              <a:rPr lang="pt-BR" smtClean="0"/>
+              <a:rPr lang="pt-BR"/>
               <a:t>Terceiro nível</a:t>
             </a:r>
           </a:p>
           <a:p>
             <a:pPr lvl="3"/>
             <a:r>
-              <a:rPr lang="pt-BR" smtClean="0"/>
+              <a:rPr lang="pt-BR"/>
               <a:t>Quarto nível</a:t>
             </a:r>
           </a:p>
           <a:p>
             <a:pPr lvl="4"/>
             <a:r>
-              <a:rPr lang="pt-BR" smtClean="0"/>
+              <a:rPr lang="pt-BR"/>
               <a:t>Quinto nível</a:t>
             </a:r>
             <a:endParaRPr lang="en-US" dirty="0"/>
@@ -9007,7 +9026,7 @@
           <a:p>
             <a:fld id="{882996C7-DA72-484F-80C9-86425D46391B}" type="datetimeFigureOut">
               <a:rPr lang="pt-BR" smtClean="0"/>
-              <a:t>04/10/2016</a:t>
+              <a:t>05/10/2016</a:t>
             </a:fld>
             <a:endParaRPr lang="pt-BR"/>
           </a:p>
@@ -9081,7 +9100,7 @@
           <a:p>
             <a:fld id="{2F9841CC-682E-4043-A1C1-95A841BBAAAC}" type="slidenum">
               <a:rPr lang="pt-BR" smtClean="0"/>
-              <a:t>‹nº›</a:t>
+              <a:t>‹#›</a:t>
             </a:fld>
             <a:endParaRPr lang="pt-BR"/>
           </a:p>
@@ -9436,10 +9455,9 @@
           <a:lstStyle/>
           <a:p>
             <a:r>
-              <a:rPr lang="pt-BR" dirty="0" smtClean="0"/>
+              <a:rPr lang="pt-BR" dirty="0"/>
               <a:t>COMUNICAÇÕES DIGITAIS</a:t>
             </a:r>
-            <a:endParaRPr lang="pt-BR" dirty="0"/>
           </a:p>
         </p:txBody>
       </p:sp>
@@ -9466,28 +9484,27 @@
           <a:lstStyle/>
           <a:p>
             <a:r>
-              <a:rPr lang="pt-BR" dirty="0" smtClean="0"/>
+              <a:rPr lang="pt-BR" dirty="0"/>
               <a:t>Arthur Ramos</a:t>
             </a:r>
           </a:p>
           <a:p>
             <a:r>
-              <a:rPr lang="pt-BR" dirty="0" smtClean="0"/>
+              <a:rPr lang="pt-BR" dirty="0"/>
               <a:t>David Anchieta</a:t>
             </a:r>
           </a:p>
           <a:p>
             <a:r>
-              <a:rPr lang="pt-BR" dirty="0" smtClean="0"/>
+              <a:rPr lang="pt-BR" dirty="0"/>
               <a:t>Hanna Carvalho</a:t>
             </a:r>
           </a:p>
           <a:p>
             <a:r>
-              <a:rPr lang="pt-BR" dirty="0" smtClean="0"/>
+              <a:rPr lang="pt-BR" dirty="0"/>
               <a:t>Itamar Soares</a:t>
             </a:r>
-            <a:endParaRPr lang="pt-BR" dirty="0"/>
           </a:p>
         </p:txBody>
       </p:sp>
@@ -9501,13 +9518,147 @@
   <p:clrMapOvr>
     <a:masterClrMapping/>
   </p:clrMapOvr>
-  <p:timing>
-    <p:tnLst>
-      <p:par>
-        <p:cTn id="1" dur="indefinite" restart="never" nodeType="tmRoot"/>
-      </p:par>
-    </p:tnLst>
-  </p:timing>
+</p:sld>
+</file>
+
+<file path=ppt/slides/slide10.xml><?xml version="1.0" encoding="utf-8"?>
+<p:sld xmlns:a="http://schemas.openxmlformats.org/drawingml/2006/main" xmlns:r="http://schemas.openxmlformats.org/officeDocument/2006/relationships" xmlns:p="http://schemas.openxmlformats.org/presentationml/2006/main">
+  <p:cSld>
+    <p:spTree>
+      <p:nvGrpSpPr>
+        <p:cNvPr id="1" name=""/>
+        <p:cNvGrpSpPr/>
+        <p:nvPr/>
+      </p:nvGrpSpPr>
+      <p:grpSpPr>
+        <a:xfrm>
+          <a:off x="0" y="0"/>
+          <a:ext cx="0" cy="0"/>
+          <a:chOff x="0" y="0"/>
+          <a:chExt cx="0" cy="0"/>
+        </a:xfrm>
+      </p:grpSpPr>
+      <p:sp>
+        <p:nvSpPr>
+          <p:cNvPr id="2" name="Title 1"/>
+          <p:cNvSpPr>
+            <a:spLocks noGrp="1"/>
+          </p:cNvSpPr>
+          <p:nvPr>
+            <p:ph type="title"/>
+          </p:nvPr>
+        </p:nvSpPr>
+        <p:spPr/>
+        <p:txBody>
+          <a:bodyPr/>
+          <a:lstStyle/>
+          <a:p>
+            <a:r>
+              <a:rPr lang="en-US" dirty="0" err="1"/>
+              <a:t>Qualidade</a:t>
+            </a:r>
+            <a:r>
+              <a:rPr lang="en-US" dirty="0"/>
+              <a:t> do </a:t>
+            </a:r>
+            <a:r>
+              <a:rPr lang="en-US" dirty="0" err="1"/>
+              <a:t>áudio</a:t>
+            </a:r>
+            <a:endParaRPr lang="en-US" dirty="0"/>
+          </a:p>
+        </p:txBody>
+      </p:sp>
+      <p:sp>
+        <p:nvSpPr>
+          <p:cNvPr id="3" name="Content Placeholder 2"/>
+          <p:cNvSpPr>
+            <a:spLocks noGrp="1"/>
+          </p:cNvSpPr>
+          <p:nvPr>
+            <p:ph idx="1"/>
+          </p:nvPr>
+        </p:nvSpPr>
+        <p:spPr/>
+        <p:txBody>
+          <a:bodyPr anchor="ctr"/>
+          <a:lstStyle/>
+          <a:p>
+            <a:pPr marL="457200" indent="-457200">
+              <a:buFont typeface="+mj-lt"/>
+              <a:buAutoNum type="arabicPeriod"/>
+            </a:pPr>
+            <a:r>
+              <a:rPr lang="en-US" dirty="0"/>
+              <a:t>BPSK</a:t>
+            </a:r>
+          </a:p>
+          <a:p>
+            <a:pPr marL="457200" indent="-457200">
+              <a:buFont typeface="+mj-lt"/>
+              <a:buAutoNum type="arabicPeriod"/>
+            </a:pPr>
+            <a:r>
+              <a:rPr lang="en-US" dirty="0"/>
+              <a:t>QUAM 16 bits (</a:t>
+            </a:r>
+            <a:r>
+              <a:rPr lang="en-US" dirty="0" err="1"/>
+              <a:t>Melhor</a:t>
+            </a:r>
+            <a:r>
+              <a:rPr lang="en-US" dirty="0"/>
+              <a:t> </a:t>
+            </a:r>
+            <a:r>
+              <a:rPr lang="en-US" dirty="0" err="1"/>
+              <a:t>custo</a:t>
+            </a:r>
+            <a:r>
+              <a:rPr lang="en-US" dirty="0"/>
+              <a:t>/</a:t>
+            </a:r>
+            <a:r>
+              <a:rPr lang="en-US" dirty="0" err="1"/>
+              <a:t>benefício</a:t>
+            </a:r>
+            <a:r>
+              <a:rPr lang="en-US" dirty="0"/>
+              <a:t>)</a:t>
+            </a:r>
+          </a:p>
+          <a:p>
+            <a:pPr marL="457200" indent="-457200">
+              <a:buFont typeface="+mj-lt"/>
+              <a:buAutoNum type="arabicPeriod"/>
+            </a:pPr>
+            <a:r>
+              <a:rPr lang="en-US" dirty="0"/>
+              <a:t>QPSK</a:t>
+            </a:r>
+          </a:p>
+          <a:p>
+            <a:pPr marL="457200" indent="-457200">
+              <a:buFont typeface="+mj-lt"/>
+              <a:buAutoNum type="arabicPeriod"/>
+            </a:pPr>
+            <a:r>
+              <a:rPr lang="en-US" dirty="0"/>
+              <a:t>PSK 8 bits</a:t>
+            </a:r>
+          </a:p>
+        </p:txBody>
+      </p:sp>
+    </p:spTree>
+    <p:extLst>
+      <p:ext uri="{BB962C8B-B14F-4D97-AF65-F5344CB8AC3E}">
+        <p14:creationId xmlns:p14="http://schemas.microsoft.com/office/powerpoint/2010/main" val="2489597937"/>
+      </p:ext>
+    </p:extLst>
+  </p:cSld>
+  <p:clrMapOvr>
+    <a:masterClrMapping/>
+  </p:clrMapOvr>
 </p:sld>
 </file>
 
@@ -9543,36 +9694,22 @@
           <a:bodyPr/>
           <a:lstStyle/>
           <a:p>
-            <a:endParaRPr lang="pt-BR"/>
-          </a:p>
-        </p:txBody>
-      </p:sp>
-      <p:sp>
-        <p:nvSpPr>
-          <p:cNvPr id="3" name="Espaço Reservado para Conteúdo 2"/>
-          <p:cNvSpPr>
-            <a:spLocks noGrp="1"/>
-          </p:cNvSpPr>
-          <p:nvPr>
-            <p:ph idx="1"/>
-          </p:nvPr>
-        </p:nvSpPr>
-        <p:spPr/>
-        <p:txBody>
-          <a:bodyPr/>
-          <a:lstStyle/>
-          <a:p>
-            <a:endParaRPr lang="pt-BR" dirty="0"/>
+            <a:r>
+              <a:rPr lang="pt-BR" dirty="0"/>
+              <a:t>Sinal Amostrado e Quantizado</a:t>
+            </a:r>
           </a:p>
         </p:txBody>
       </p:sp>
       <p:pic>
         <p:nvPicPr>
-          <p:cNvPr id="3074" name="Picture 2"/>
+          <p:cNvPr id="9" name="Content Placeholder 8"/>
           <p:cNvPicPr>
-            <a:picLocks noChangeAspect="1" noChangeArrowheads="1"/>
+            <a:picLocks noGrp="1" noChangeAspect="1"/>
           </p:cNvPicPr>
-          <p:nvPr/>
+          <p:nvPr>
+            <p:ph idx="1"/>
+          </p:nvPr>
         </p:nvPicPr>
         <p:blipFill>
           <a:blip r:embed="rId2">
@@ -9582,116 +9719,15 @@
               </a:ext>
             </a:extLst>
           </a:blip>
-          <a:srcRect/>
           <a:stretch>
             <a:fillRect/>
           </a:stretch>
         </p:blipFill>
-        <p:spPr bwMode="auto">
+        <p:spPr>
           <a:xfrm>
-            <a:off x="395537" y="1938625"/>
-            <a:ext cx="4104455" cy="3091190"/>
+            <a:off x="502567" y="1862758"/>
+            <a:ext cx="8138865" cy="4000847"/>
           </a:xfrm>
-          <a:prstGeom prst="rect">
-            <a:avLst/>
-          </a:prstGeom>
-          <a:noFill/>
-          <a:ln>
-            <a:noFill/>
-          </a:ln>
-          <a:effectLst/>
-          <a:extLst>
-            <a:ext uri="{909E8E84-426E-40DD-AFC4-6F175D3DCCD1}">
-              <a14:hiddenFill xmlns:a14="http://schemas.microsoft.com/office/drawing/2010/main">
-                <a:solidFill>
-                  <a:schemeClr val="accent1"/>
-                </a:solidFill>
-              </a14:hiddenFill>
-            </a:ext>
-            <a:ext uri="{91240B29-F687-4F45-9708-019B960494DF}">
-              <a14:hiddenLine xmlns:a14="http://schemas.microsoft.com/office/drawing/2010/main" w="9525">
-                <a:solidFill>
-                  <a:schemeClr val="tx1"/>
-                </a:solidFill>
-                <a:miter lim="800000"/>
-                <a:headEnd/>
-                <a:tailEnd/>
-              </a14:hiddenLine>
-            </a:ext>
-            <a:ext uri="{AF507438-7753-43E0-B8FC-AC1667EBCBE1}">
-              <a14:hiddenEffects xmlns:a14="http://schemas.microsoft.com/office/drawing/2010/main">
-                <a:effectLst>
-                  <a:outerShdw dist="35921" dir="2700000" algn="ctr" rotWithShape="0">
-                    <a:schemeClr val="bg2"/>
-                  </a:outerShdw>
-                </a:effectLst>
-              </a14:hiddenEffects>
-            </a:ext>
-          </a:extLst>
-        </p:spPr>
-      </p:pic>
-      <p:pic>
-        <p:nvPicPr>
-          <p:cNvPr id="3075" name="Picture 3"/>
-          <p:cNvPicPr>
-            <a:picLocks noChangeAspect="1" noChangeArrowheads="1"/>
-          </p:cNvPicPr>
-          <p:nvPr/>
-        </p:nvPicPr>
-        <p:blipFill>
-          <a:blip r:embed="rId3">
-            <a:extLst>
-              <a:ext uri="{28A0092B-C50C-407E-A947-70E740481C1C}">
-                <a14:useLocalDpi xmlns:a14="http://schemas.microsoft.com/office/drawing/2010/main" val="0"/>
-              </a:ext>
-            </a:extLst>
-          </a:blip>
-          <a:srcRect/>
-          <a:stretch>
-            <a:fillRect/>
-          </a:stretch>
-        </p:blipFill>
-        <p:spPr bwMode="auto">
-          <a:xfrm>
-            <a:off x="4644008" y="1938625"/>
-            <a:ext cx="4176464" cy="3147263"/>
-          </a:xfrm>
-          <a:prstGeom prst="rect">
-            <a:avLst/>
-          </a:prstGeom>
-          <a:noFill/>
-          <a:ln>
-            <a:noFill/>
-          </a:ln>
-          <a:effectLst/>
-          <a:extLst>
-            <a:ext uri="{909E8E84-426E-40DD-AFC4-6F175D3DCCD1}">
-              <a14:hiddenFill xmlns:a14="http://schemas.microsoft.com/office/drawing/2010/main">
-                <a:solidFill>
-                  <a:schemeClr val="accent1"/>
-                </a:solidFill>
-              </a14:hiddenFill>
-            </a:ext>
-            <a:ext uri="{91240B29-F687-4F45-9708-019B960494DF}">
-              <a14:hiddenLine xmlns:a14="http://schemas.microsoft.com/office/drawing/2010/main" w="9525">
-                <a:solidFill>
-                  <a:schemeClr val="tx1"/>
-                </a:solidFill>
-                <a:miter lim="800000"/>
-                <a:headEnd/>
-                <a:tailEnd/>
-              </a14:hiddenLine>
-            </a:ext>
-            <a:ext uri="{AF507438-7753-43E0-B8FC-AC1667EBCBE1}">
-              <a14:hiddenEffects xmlns:a14="http://schemas.microsoft.com/office/drawing/2010/main">
-                <a:effectLst>
-                  <a:outerShdw dist="35921" dir="2700000" algn="ctr" rotWithShape="0">
-                    <a:schemeClr val="bg2"/>
-                  </a:outerShdw>
-                </a:effectLst>
-              </a14:hiddenEffects>
-            </a:ext>
-          </a:extLst>
         </p:spPr>
       </p:pic>
     </p:spTree>
@@ -9704,13 +9740,6 @@
   <p:clrMapOvr>
     <a:masterClrMapping/>
   </p:clrMapOvr>
-  <p:timing>
-    <p:tnLst>
-      <p:par>
-        <p:cTn id="1" dur="indefinite" restart="never" nodeType="tmRoot"/>
-      </p:par>
-    </p:tnLst>
-  </p:timing>
 </p:sld>
 </file>
 
@@ -9746,174 +9775,82 @@
           <a:bodyPr/>
           <a:lstStyle/>
           <a:p>
-            <a:endParaRPr lang="pt-BR"/>
-          </a:p>
-        </p:txBody>
-      </p:sp>
-      <p:sp>
-        <p:nvSpPr>
-          <p:cNvPr id="3" name="Espaço Reservado para Conteúdo 2"/>
-          <p:cNvSpPr>
-            <a:spLocks noGrp="1"/>
-          </p:cNvSpPr>
-          <p:nvPr>
-            <p:ph idx="1"/>
-          </p:nvPr>
-        </p:nvSpPr>
-        <p:spPr/>
-        <p:txBody>
-          <a:bodyPr/>
-          <a:lstStyle/>
-          <a:p>
-            <a:endParaRPr lang="pt-BR" dirty="0"/>
+            <a:r>
+              <a:rPr lang="pt-BR" dirty="0"/>
+              <a:t>BPSK</a:t>
+            </a:r>
           </a:p>
         </p:txBody>
       </p:sp>
       <p:pic>
         <p:nvPicPr>
-          <p:cNvPr id="4098" name="Picture 2"/>
+          <p:cNvPr id="4" name="Content Placeholder 3"/>
           <p:cNvPicPr>
-            <a:picLocks noChangeAspect="1" noChangeArrowheads="1"/>
+            <a:picLocks noGrp="1" noChangeAspect="1"/>
           </p:cNvPicPr>
-          <p:nvPr/>
+          <p:nvPr>
+            <p:ph idx="1"/>
+          </p:nvPr>
         </p:nvPicPr>
         <p:blipFill>
-          <a:blip r:embed="rId2">
+          <a:blip r:embed="rId2" cstate="print">
             <a:extLst>
               <a:ext uri="{28A0092B-C50C-407E-A947-70E740481C1C}">
                 <a14:useLocalDpi xmlns:a14="http://schemas.microsoft.com/office/drawing/2010/main" val="0"/>
               </a:ext>
             </a:extLst>
           </a:blip>
-          <a:srcRect/>
           <a:stretch>
             <a:fillRect/>
           </a:stretch>
         </p:blipFill>
-        <p:spPr bwMode="auto">
+        <p:spPr>
           <a:xfrm>
-            <a:off x="251520" y="1569012"/>
-            <a:ext cx="4248472" cy="3201527"/>
+            <a:off x="179512" y="2058941"/>
+            <a:ext cx="4176464" cy="3132349"/>
           </a:xfrm>
-          <a:prstGeom prst="rect">
-            <a:avLst/>
-          </a:prstGeom>
-          <a:noFill/>
-          <a:ln>
-            <a:noFill/>
-          </a:ln>
-          <a:effectLst/>
-          <a:extLst>
-            <a:ext uri="{909E8E84-426E-40DD-AFC4-6F175D3DCCD1}">
-              <a14:hiddenFill xmlns:a14="http://schemas.microsoft.com/office/drawing/2010/main">
-                <a:solidFill>
-                  <a:schemeClr val="accent1"/>
-                </a:solidFill>
-              </a14:hiddenFill>
-            </a:ext>
-            <a:ext uri="{91240B29-F687-4F45-9708-019B960494DF}">
-              <a14:hiddenLine xmlns:a14="http://schemas.microsoft.com/office/drawing/2010/main" w="9525">
-                <a:solidFill>
-                  <a:schemeClr val="tx1"/>
-                </a:solidFill>
-                <a:miter lim="800000"/>
-                <a:headEnd/>
-                <a:tailEnd/>
-              </a14:hiddenLine>
-            </a:ext>
-            <a:ext uri="{AF507438-7753-43E0-B8FC-AC1667EBCBE1}">
-              <a14:hiddenEffects xmlns:a14="http://schemas.microsoft.com/office/drawing/2010/main">
-                <a:effectLst>
-                  <a:outerShdw dist="35921" dir="2700000" algn="ctr" rotWithShape="0">
-                    <a:schemeClr val="bg2"/>
-                  </a:outerShdw>
-                </a:effectLst>
-              </a14:hiddenEffects>
-            </a:ext>
-          </a:extLst>
         </p:spPr>
       </p:pic>
       <p:pic>
         <p:nvPicPr>
-          <p:cNvPr id="4099" name="Picture 3"/>
+          <p:cNvPr id="5" name="Picture 4"/>
           <p:cNvPicPr>
-            <a:picLocks noChangeAspect="1" noChangeArrowheads="1"/>
+            <a:picLocks noChangeAspect="1"/>
           </p:cNvPicPr>
           <p:nvPr/>
         </p:nvPicPr>
         <p:blipFill>
-          <a:blip r:embed="rId3">
+          <a:blip r:embed="rId3" cstate="print">
             <a:extLst>
               <a:ext uri="{28A0092B-C50C-407E-A947-70E740481C1C}">
                 <a14:useLocalDpi xmlns:a14="http://schemas.microsoft.com/office/drawing/2010/main" val="0"/>
               </a:ext>
             </a:extLst>
           </a:blip>
-          <a:srcRect/>
           <a:stretch>
             <a:fillRect/>
           </a:stretch>
         </p:blipFill>
-        <p:spPr bwMode="auto">
+        <p:spPr>
           <a:xfrm>
-            <a:off x="4716016" y="1589328"/>
-            <a:ext cx="4247008" cy="3213747"/>
+            <a:off x="4661792" y="2036821"/>
+            <a:ext cx="4235451" cy="3176589"/>
           </a:xfrm>
           <a:prstGeom prst="rect">
             <a:avLst/>
           </a:prstGeom>
-          <a:noFill/>
-          <a:ln>
-            <a:noFill/>
-          </a:ln>
-          <a:effectLst/>
-          <a:extLst>
-            <a:ext uri="{909E8E84-426E-40DD-AFC4-6F175D3DCCD1}">
-              <a14:hiddenFill xmlns:a14="http://schemas.microsoft.com/office/drawing/2010/main">
-                <a:solidFill>
-                  <a:schemeClr val="accent1"/>
-                </a:solidFill>
-              </a14:hiddenFill>
-            </a:ext>
-            <a:ext uri="{91240B29-F687-4F45-9708-019B960494DF}">
-              <a14:hiddenLine xmlns:a14="http://schemas.microsoft.com/office/drawing/2010/main" w="9525">
-                <a:solidFill>
-                  <a:schemeClr val="tx1"/>
-                </a:solidFill>
-                <a:miter lim="800000"/>
-                <a:headEnd/>
-                <a:tailEnd/>
-              </a14:hiddenLine>
-            </a:ext>
-            <a:ext uri="{AF507438-7753-43E0-B8FC-AC1667EBCBE1}">
-              <a14:hiddenEffects xmlns:a14="http://schemas.microsoft.com/office/drawing/2010/main">
-                <a:effectLst>
-                  <a:outerShdw dist="35921" dir="2700000" algn="ctr" rotWithShape="0">
-                    <a:schemeClr val="bg2"/>
-                  </a:outerShdw>
-                </a:effectLst>
-              </a14:hiddenEffects>
-            </a:ext>
-          </a:extLst>
         </p:spPr>
       </p:pic>
     </p:spTree>
     <p:extLst>
       <p:ext uri="{BB962C8B-B14F-4D97-AF65-F5344CB8AC3E}">
-        <p14:creationId xmlns:p14="http://schemas.microsoft.com/office/powerpoint/2010/main" val="789780614"/>
+        <p14:creationId xmlns:p14="http://schemas.microsoft.com/office/powerpoint/2010/main" val="2242282814"/>
       </p:ext>
     </p:extLst>
   </p:cSld>
   <p:clrMapOvr>
     <a:masterClrMapping/>
   </p:clrMapOvr>
-  <p:timing>
-    <p:tnLst>
-      <p:par>
-        <p:cTn id="1" dur="indefinite" restart="never" nodeType="tmRoot"/>
-      </p:par>
-    </p:tnLst>
-  </p:timing>
 </p:sld>
 </file>
 
@@ -9949,46 +9886,82 @@
           <a:bodyPr/>
           <a:lstStyle/>
           <a:p>
-            <a:endParaRPr lang="pt-BR"/>
+            <a:r>
+              <a:rPr lang="pt-BR" dirty="0"/>
+              <a:t>QPSK</a:t>
+            </a:r>
           </a:p>
         </p:txBody>
       </p:sp>
-      <p:sp>
-        <p:nvSpPr>
-          <p:cNvPr id="3" name="Espaço Reservado para Conteúdo 2"/>
-          <p:cNvSpPr>
-            <a:spLocks noGrp="1"/>
-          </p:cNvSpPr>
+      <p:pic>
+        <p:nvPicPr>
+          <p:cNvPr id="4" name="Content Placeholder 3"/>
+          <p:cNvPicPr>
+            <a:picLocks noGrp="1" noChangeAspect="1"/>
+          </p:cNvPicPr>
           <p:nvPr>
             <p:ph idx="1"/>
           </p:nvPr>
-        </p:nvSpPr>
-        <p:spPr/>
-        <p:txBody>
-          <a:bodyPr/>
-          <a:lstStyle/>
-          <a:p>
-            <a:endParaRPr lang="pt-BR"/>
-          </a:p>
-        </p:txBody>
-      </p:sp>
+        </p:nvPicPr>
+        <p:blipFill>
+          <a:blip r:embed="rId2" cstate="print">
+            <a:extLst>
+              <a:ext uri="{28A0092B-C50C-407E-A947-70E740481C1C}">
+                <a14:useLocalDpi xmlns:a14="http://schemas.microsoft.com/office/drawing/2010/main" val="0"/>
+              </a:ext>
+            </a:extLst>
+          </a:blip>
+          <a:stretch>
+            <a:fillRect/>
+          </a:stretch>
+        </p:blipFill>
+        <p:spPr>
+          <a:xfrm>
+            <a:off x="251521" y="2394780"/>
+            <a:ext cx="4248471" cy="3186353"/>
+          </a:xfrm>
+        </p:spPr>
+      </p:pic>
+      <p:pic>
+        <p:nvPicPr>
+          <p:cNvPr id="5" name="Picture 4"/>
+          <p:cNvPicPr>
+            <a:picLocks noChangeAspect="1"/>
+          </p:cNvPicPr>
+          <p:nvPr/>
+        </p:nvPicPr>
+        <p:blipFill>
+          <a:blip r:embed="rId3" cstate="print">
+            <a:extLst>
+              <a:ext uri="{28A0092B-C50C-407E-A947-70E740481C1C}">
+                <a14:useLocalDpi xmlns:a14="http://schemas.microsoft.com/office/drawing/2010/main" val="0"/>
+              </a:ext>
+            </a:extLst>
+          </a:blip>
+          <a:stretch>
+            <a:fillRect/>
+          </a:stretch>
+        </p:blipFill>
+        <p:spPr>
+          <a:xfrm>
+            <a:off x="4644008" y="2394780"/>
+            <a:ext cx="4248470" cy="3186353"/>
+          </a:xfrm>
+          <a:prstGeom prst="rect">
+            <a:avLst/>
+          </a:prstGeom>
+        </p:spPr>
+      </p:pic>
     </p:spTree>
     <p:extLst>
       <p:ext uri="{BB962C8B-B14F-4D97-AF65-F5344CB8AC3E}">
-        <p14:creationId xmlns:p14="http://schemas.microsoft.com/office/powerpoint/2010/main" val="513955916"/>
+        <p14:creationId xmlns:p14="http://schemas.microsoft.com/office/powerpoint/2010/main" val="789780614"/>
       </p:ext>
     </p:extLst>
   </p:cSld>
   <p:clrMapOvr>
     <a:masterClrMapping/>
   </p:clrMapOvr>
-  <p:timing>
-    <p:tnLst>
-      <p:par>
-        <p:cTn id="1" dur="indefinite" restart="never" nodeType="tmRoot"/>
-      </p:par>
-    </p:tnLst>
-  </p:timing>
 </p:sld>
 </file>
 
@@ -10021,177 +9994,87 @@
         </p:nvSpPr>
         <p:spPr/>
         <p:txBody>
-          <a:bodyPr/>
+          <a:bodyPr>
+            <a:normAutofit/>
+          </a:bodyPr>
           <a:lstStyle/>
           <a:p>
-            <a:endParaRPr lang="pt-BR"/>
-          </a:p>
-        </p:txBody>
-      </p:sp>
-      <p:sp>
-        <p:nvSpPr>
-          <p:cNvPr id="3" name="Espaço Reservado para Conteúdo 2"/>
-          <p:cNvSpPr>
-            <a:spLocks noGrp="1"/>
-          </p:cNvSpPr>
-          <p:nvPr>
-            <p:ph idx="1"/>
-          </p:nvPr>
-        </p:nvSpPr>
-        <p:spPr/>
-        <p:txBody>
-          <a:bodyPr/>
-          <a:lstStyle/>
-          <a:p>
-            <a:endParaRPr lang="pt-BR" dirty="0"/>
+            <a:r>
+              <a:rPr lang="pt-BR" dirty="0"/>
+              <a:t>PSK 8 bits</a:t>
+            </a:r>
           </a:p>
         </p:txBody>
       </p:sp>
       <p:pic>
         <p:nvPicPr>
-          <p:cNvPr id="5122" name="Picture 2"/>
+          <p:cNvPr id="4" name="Content Placeholder 3"/>
           <p:cNvPicPr>
-            <a:picLocks noChangeAspect="1" noChangeArrowheads="1"/>
+            <a:picLocks noGrp="1" noChangeAspect="1"/>
           </p:cNvPicPr>
-          <p:nvPr/>
+          <p:nvPr>
+            <p:ph idx="1"/>
+          </p:nvPr>
         </p:nvPicPr>
         <p:blipFill>
-          <a:blip r:embed="rId2">
+          <a:blip r:embed="rId2" cstate="print">
             <a:extLst>
               <a:ext uri="{28A0092B-C50C-407E-A947-70E740481C1C}">
                 <a14:useLocalDpi xmlns:a14="http://schemas.microsoft.com/office/drawing/2010/main" val="0"/>
               </a:ext>
             </a:extLst>
           </a:blip>
-          <a:srcRect/>
           <a:stretch>
             <a:fillRect/>
           </a:stretch>
         </p:blipFill>
-        <p:spPr bwMode="auto">
+        <p:spPr>
           <a:xfrm>
-            <a:off x="346993" y="1719014"/>
-            <a:ext cx="4216979" cy="3168352"/>
+            <a:off x="323528" y="1772816"/>
+            <a:ext cx="4224467" cy="3168351"/>
           </a:xfrm>
-          <a:prstGeom prst="rect">
-            <a:avLst/>
-          </a:prstGeom>
-          <a:noFill/>
-          <a:ln>
-            <a:noFill/>
-          </a:ln>
-          <a:effectLst/>
-          <a:extLst>
-            <a:ext uri="{909E8E84-426E-40DD-AFC4-6F175D3DCCD1}">
-              <a14:hiddenFill xmlns:a14="http://schemas.microsoft.com/office/drawing/2010/main">
-                <a:solidFill>
-                  <a:schemeClr val="accent1"/>
-                </a:solidFill>
-              </a14:hiddenFill>
-            </a:ext>
-            <a:ext uri="{91240B29-F687-4F45-9708-019B960494DF}">
-              <a14:hiddenLine xmlns:a14="http://schemas.microsoft.com/office/drawing/2010/main" w="9525">
-                <a:solidFill>
-                  <a:schemeClr val="tx1"/>
-                </a:solidFill>
-                <a:miter lim="800000"/>
-                <a:headEnd/>
-                <a:tailEnd/>
-              </a14:hiddenLine>
-            </a:ext>
-            <a:ext uri="{AF507438-7753-43E0-B8FC-AC1667EBCBE1}">
-              <a14:hiddenEffects xmlns:a14="http://schemas.microsoft.com/office/drawing/2010/main">
-                <a:effectLst>
-                  <a:outerShdw dist="35921" dir="2700000" algn="ctr" rotWithShape="0">
-                    <a:schemeClr val="bg2"/>
-                  </a:outerShdw>
-                </a:effectLst>
-              </a14:hiddenEffects>
-            </a:ext>
-          </a:extLst>
         </p:spPr>
       </p:pic>
       <p:pic>
         <p:nvPicPr>
-          <p:cNvPr id="5123" name="Picture 3"/>
+          <p:cNvPr id="5" name="Picture 4"/>
           <p:cNvPicPr>
-            <a:picLocks noChangeAspect="1" noChangeArrowheads="1"/>
+            <a:picLocks noChangeAspect="1"/>
           </p:cNvPicPr>
           <p:nvPr/>
         </p:nvPicPr>
         <p:blipFill>
-          <a:blip r:embed="rId3">
+          <a:blip r:embed="rId3" cstate="print">
             <a:extLst>
               <a:ext uri="{28A0092B-C50C-407E-A947-70E740481C1C}">
                 <a14:useLocalDpi xmlns:a14="http://schemas.microsoft.com/office/drawing/2010/main" val="0"/>
               </a:ext>
             </a:extLst>
           </a:blip>
-          <a:srcRect/>
           <a:stretch>
             <a:fillRect/>
           </a:stretch>
         </p:blipFill>
-        <p:spPr bwMode="auto">
+        <p:spPr>
           <a:xfrm>
-            <a:off x="4572000" y="1700808"/>
-            <a:ext cx="4243710" cy="3186558"/>
+            <a:off x="4624795" y="1772815"/>
+            <a:ext cx="4224470" cy="3168352"/>
           </a:xfrm>
           <a:prstGeom prst="rect">
             <a:avLst/>
           </a:prstGeom>
-          <a:noFill/>
-          <a:ln>
-            <a:noFill/>
-          </a:ln>
-          <a:effectLst/>
-          <a:extLst>
-            <a:ext uri="{909E8E84-426E-40DD-AFC4-6F175D3DCCD1}">
-              <a14:hiddenFill xmlns:a14="http://schemas.microsoft.com/office/drawing/2010/main">
-                <a:solidFill>
-                  <a:schemeClr val="accent1"/>
-                </a:solidFill>
-              </a14:hiddenFill>
-            </a:ext>
-            <a:ext uri="{91240B29-F687-4F45-9708-019B960494DF}">
-              <a14:hiddenLine xmlns:a14="http://schemas.microsoft.com/office/drawing/2010/main" w="9525">
-                <a:solidFill>
-                  <a:schemeClr val="tx1"/>
-                </a:solidFill>
-                <a:miter lim="800000"/>
-                <a:headEnd/>
-                <a:tailEnd/>
-              </a14:hiddenLine>
-            </a:ext>
-            <a:ext uri="{AF507438-7753-43E0-B8FC-AC1667EBCBE1}">
-              <a14:hiddenEffects xmlns:a14="http://schemas.microsoft.com/office/drawing/2010/main">
-                <a:effectLst>
-                  <a:outerShdw dist="35921" dir="2700000" algn="ctr" rotWithShape="0">
-                    <a:schemeClr val="bg2"/>
-                  </a:outerShdw>
-                </a:effectLst>
-              </a14:hiddenEffects>
-            </a:ext>
-          </a:extLst>
         </p:spPr>
       </p:pic>
     </p:spTree>
     <p:extLst>
       <p:ext uri="{BB962C8B-B14F-4D97-AF65-F5344CB8AC3E}">
-        <p14:creationId xmlns:p14="http://schemas.microsoft.com/office/powerpoint/2010/main" val="867185119"/>
+        <p14:creationId xmlns:p14="http://schemas.microsoft.com/office/powerpoint/2010/main" val="513955916"/>
       </p:ext>
     </p:extLst>
   </p:cSld>
   <p:clrMapOvr>
     <a:masterClrMapping/>
   </p:clrMapOvr>
-  <p:timing>
-    <p:tnLst>
-      <p:par>
-        <p:cTn id="1" dur="indefinite" restart="never" nodeType="tmRoot"/>
-      </p:par>
-    </p:tnLst>
-  </p:timing>
 </p:sld>
 </file>
 
@@ -10224,113 +10107,87 @@
         </p:nvSpPr>
         <p:spPr/>
         <p:txBody>
-          <a:bodyPr/>
+          <a:bodyPr>
+            <a:normAutofit/>
+          </a:bodyPr>
           <a:lstStyle/>
           <a:p>
-            <a:endParaRPr lang="pt-BR"/>
-          </a:p>
-        </p:txBody>
-      </p:sp>
-      <p:sp>
-        <p:nvSpPr>
-          <p:cNvPr id="3" name="Espaço Reservado para Conteúdo 2"/>
-          <p:cNvSpPr>
-            <a:spLocks noGrp="1"/>
-          </p:cNvSpPr>
-          <p:nvPr>
-            <p:ph idx="1"/>
-          </p:nvPr>
-        </p:nvSpPr>
-        <p:spPr/>
-        <p:txBody>
-          <a:bodyPr/>
-          <a:lstStyle/>
-          <a:p>
-            <a:endParaRPr lang="pt-BR"/>
+            <a:r>
+              <a:rPr lang="pt-BR" dirty="0"/>
+              <a:t>PSK 16 bits</a:t>
+            </a:r>
           </a:p>
         </p:txBody>
       </p:sp>
       <p:pic>
         <p:nvPicPr>
-          <p:cNvPr id="6146" name="Picture 2"/>
+          <p:cNvPr id="4" name="Content Placeholder 3"/>
           <p:cNvPicPr>
-            <a:picLocks noChangeAspect="1" noChangeArrowheads="1"/>
+            <a:picLocks noGrp="1" noChangeAspect="1"/>
           </p:cNvPicPr>
-          <p:nvPr/>
+          <p:nvPr>
+            <p:ph idx="1"/>
+          </p:nvPr>
         </p:nvPicPr>
         <p:blipFill>
-          <a:blip r:embed="rId2">
+          <a:blip r:embed="rId2" cstate="print">
             <a:extLst>
               <a:ext uri="{28A0092B-C50C-407E-A947-70E740481C1C}">
                 <a14:useLocalDpi xmlns:a14="http://schemas.microsoft.com/office/drawing/2010/main" val="0"/>
               </a:ext>
             </a:extLst>
           </a:blip>
-          <a:srcRect/>
           <a:stretch>
             <a:fillRect/>
           </a:stretch>
         </p:blipFill>
-        <p:spPr bwMode="auto">
+        <p:spPr>
           <a:xfrm>
-            <a:off x="107504" y="1628800"/>
-            <a:ext cx="5334000" cy="4029075"/>
+            <a:off x="393672" y="1844825"/>
+            <a:ext cx="4178328" cy="3133746"/>
+          </a:xfrm>
+        </p:spPr>
+      </p:pic>
+      <p:pic>
+        <p:nvPicPr>
+          <p:cNvPr id="5" name="Picture 4"/>
+          <p:cNvPicPr>
+            <a:picLocks noChangeAspect="1"/>
+          </p:cNvPicPr>
+          <p:nvPr/>
+        </p:nvPicPr>
+        <p:blipFill>
+          <a:blip r:embed="rId3" cstate="print">
+            <a:extLst>
+              <a:ext uri="{28A0092B-C50C-407E-A947-70E740481C1C}">
+                <a14:useLocalDpi xmlns:a14="http://schemas.microsoft.com/office/drawing/2010/main" val="0"/>
+              </a:ext>
+            </a:extLst>
+          </a:blip>
+          <a:stretch>
+            <a:fillRect/>
+          </a:stretch>
+        </p:blipFill>
+        <p:spPr>
+          <a:xfrm>
+            <a:off x="4716016" y="1844824"/>
+            <a:ext cx="4178328" cy="3133746"/>
           </a:xfrm>
           <a:prstGeom prst="rect">
             <a:avLst/>
           </a:prstGeom>
-          <a:noFill/>
-          <a:ln>
-            <a:noFill/>
-          </a:ln>
-          <a:effectLst/>
-          <a:extLst>
-            <a:ext uri="{909E8E84-426E-40DD-AFC4-6F175D3DCCD1}">
-              <a14:hiddenFill xmlns:a14="http://schemas.microsoft.com/office/drawing/2010/main">
-                <a:solidFill>
-                  <a:schemeClr val="accent1"/>
-                </a:solidFill>
-              </a14:hiddenFill>
-            </a:ext>
-            <a:ext uri="{91240B29-F687-4F45-9708-019B960494DF}">
-              <a14:hiddenLine xmlns:a14="http://schemas.microsoft.com/office/drawing/2010/main" w="9525">
-                <a:solidFill>
-                  <a:schemeClr val="tx1"/>
-                </a:solidFill>
-                <a:miter lim="800000"/>
-                <a:headEnd/>
-                <a:tailEnd/>
-              </a14:hiddenLine>
-            </a:ext>
-            <a:ext uri="{AF507438-7753-43E0-B8FC-AC1667EBCBE1}">
-              <a14:hiddenEffects xmlns:a14="http://schemas.microsoft.com/office/drawing/2010/main">
-                <a:effectLst>
-                  <a:outerShdw dist="35921" dir="2700000" algn="ctr" rotWithShape="0">
-                    <a:schemeClr val="bg2"/>
-                  </a:outerShdw>
-                </a:effectLst>
-              </a14:hiddenEffects>
-            </a:ext>
-          </a:extLst>
         </p:spPr>
       </p:pic>
     </p:spTree>
     <p:extLst>
       <p:ext uri="{BB962C8B-B14F-4D97-AF65-F5344CB8AC3E}">
-        <p14:creationId xmlns:p14="http://schemas.microsoft.com/office/powerpoint/2010/main" val="2005966454"/>
+        <p14:creationId xmlns:p14="http://schemas.microsoft.com/office/powerpoint/2010/main" val="867185119"/>
       </p:ext>
     </p:extLst>
   </p:cSld>
   <p:clrMapOvr>
     <a:masterClrMapping/>
   </p:clrMapOvr>
-  <p:timing>
-    <p:tnLst>
-      <p:par>
-        <p:cTn id="1" dur="indefinite" restart="never" nodeType="tmRoot"/>
-      </p:par>
-    </p:tnLst>
-  </p:timing>
 </p:sld>
 </file>
 
@@ -10363,21 +10220,115 @@
         </p:nvSpPr>
         <p:spPr/>
         <p:txBody>
-          <a:bodyPr/>
+          <a:bodyPr>
+            <a:normAutofit/>
+          </a:bodyPr>
           <a:lstStyle/>
           <a:p>
-            <a:endParaRPr lang="pt-BR"/>
+            <a:r>
+              <a:rPr lang="pt-BR" dirty="0"/>
+              <a:t>PSK 32 bits</a:t>
+            </a:r>
           </a:p>
         </p:txBody>
       </p:sp>
+      <p:pic>
+        <p:nvPicPr>
+          <p:cNvPr id="4" name="Content Placeholder 3"/>
+          <p:cNvPicPr>
+            <a:picLocks noGrp="1" noChangeAspect="1"/>
+          </p:cNvPicPr>
+          <p:nvPr>
+            <p:ph idx="1"/>
+          </p:nvPr>
+        </p:nvPicPr>
+        <p:blipFill>
+          <a:blip r:embed="rId2" cstate="print">
+            <a:extLst>
+              <a:ext uri="{28A0092B-C50C-407E-A947-70E740481C1C}">
+                <a14:useLocalDpi xmlns:a14="http://schemas.microsoft.com/office/drawing/2010/main" val="0"/>
+              </a:ext>
+            </a:extLst>
+          </a:blip>
+          <a:stretch>
+            <a:fillRect/>
+          </a:stretch>
+        </p:blipFill>
+        <p:spPr>
+          <a:xfrm>
+            <a:off x="239307" y="1857792"/>
+            <a:ext cx="4299833" cy="3224875"/>
+          </a:xfrm>
+        </p:spPr>
+      </p:pic>
+      <p:pic>
+        <p:nvPicPr>
+          <p:cNvPr id="5" name="Picture 4"/>
+          <p:cNvPicPr>
+            <a:picLocks noChangeAspect="1"/>
+          </p:cNvPicPr>
+          <p:nvPr/>
+        </p:nvPicPr>
+        <p:blipFill>
+          <a:blip r:embed="rId3" cstate="print">
+            <a:extLst>
+              <a:ext uri="{28A0092B-C50C-407E-A947-70E740481C1C}">
+                <a14:useLocalDpi xmlns:a14="http://schemas.microsoft.com/office/drawing/2010/main" val="0"/>
+              </a:ext>
+            </a:extLst>
+          </a:blip>
+          <a:stretch>
+            <a:fillRect/>
+          </a:stretch>
+        </p:blipFill>
+        <p:spPr>
+          <a:xfrm>
+            <a:off x="4644008" y="1860309"/>
+            <a:ext cx="4296477" cy="3222358"/>
+          </a:xfrm>
+          <a:prstGeom prst="rect">
+            <a:avLst/>
+          </a:prstGeom>
+        </p:spPr>
+      </p:pic>
+    </p:spTree>
+    <p:extLst>
+      <p:ext uri="{BB962C8B-B14F-4D97-AF65-F5344CB8AC3E}">
+        <p14:creationId xmlns:p14="http://schemas.microsoft.com/office/powerpoint/2010/main" val="2005966454"/>
+      </p:ext>
+    </p:extLst>
+  </p:cSld>
+  <p:clrMapOvr>
+    <a:masterClrMapping/>
+  </p:clrMapOvr>
+</p:sld>
+</file>
+
+<file path=ppt/slides/slide8.xml><?xml version="1.0" encoding="utf-8"?>
+<p:sld xmlns:a="http://schemas.openxmlformats.org/drawingml/2006/main" xmlns:r="http://schemas.openxmlformats.org/officeDocument/2006/relationships" xmlns:p="http://schemas.openxmlformats.org/presentationml/2006/main">
+  <p:cSld>
+    <p:spTree>
+      <p:nvGrpSpPr>
+        <p:cNvPr id="1" name=""/>
+        <p:cNvGrpSpPr/>
+        <p:nvPr/>
+      </p:nvGrpSpPr>
+      <p:grpSpPr>
+        <a:xfrm>
+          <a:off x="0" y="0"/>
+          <a:ext cx="0" cy="0"/>
+          <a:chOff x="0" y="0"/>
+          <a:chExt cx="0" cy="0"/>
+        </a:xfrm>
+      </p:grpSpPr>
       <p:sp>
         <p:nvSpPr>
-          <p:cNvPr id="3" name="Espaço Reservado para Conteúdo 2"/>
+          <p:cNvPr id="2" name="Título 1"/>
           <p:cNvSpPr>
             <a:spLocks noGrp="1"/>
           </p:cNvSpPr>
           <p:nvPr>
-            <p:ph idx="1"/>
+            <p:ph type="title"/>
           </p:nvPr>
         </p:nvSpPr>
         <p:spPr/>
@@ -10385,72 +10336,70 @@
           <a:bodyPr/>
           <a:lstStyle/>
           <a:p>
-            <a:endParaRPr lang="pt-BR"/>
+            <a:r>
+              <a:rPr lang="pt-BR" dirty="0"/>
+              <a:t>QUAM 16 bits</a:t>
+            </a:r>
           </a:p>
         </p:txBody>
       </p:sp>
       <p:pic>
         <p:nvPicPr>
-          <p:cNvPr id="7170" name="Picture 2"/>
+          <p:cNvPr id="4" name="Content Placeholder 3"/>
           <p:cNvPicPr>
-            <a:picLocks noChangeAspect="1" noChangeArrowheads="1"/>
+            <a:picLocks noGrp="1" noChangeAspect="1"/>
           </p:cNvPicPr>
-          <p:nvPr/>
+          <p:nvPr>
+            <p:ph idx="1"/>
+          </p:nvPr>
         </p:nvPicPr>
         <p:blipFill>
-          <a:blip r:embed="rId2">
+          <a:blip r:embed="rId2" cstate="print">
             <a:extLst>
               <a:ext uri="{28A0092B-C50C-407E-A947-70E740481C1C}">
                 <a14:useLocalDpi xmlns:a14="http://schemas.microsoft.com/office/drawing/2010/main" val="0"/>
               </a:ext>
             </a:extLst>
           </a:blip>
-          <a:srcRect/>
           <a:stretch>
             <a:fillRect/>
           </a:stretch>
         </p:blipFill>
-        <p:spPr bwMode="auto">
+        <p:spPr>
           <a:xfrm>
-            <a:off x="251520" y="1844824"/>
-            <a:ext cx="5362575" cy="4029075"/>
+            <a:off x="251520" y="2204864"/>
+            <a:ext cx="4248472" cy="3186354"/>
+          </a:xfrm>
+        </p:spPr>
+      </p:pic>
+      <p:pic>
+        <p:nvPicPr>
+          <p:cNvPr id="5" name="Picture 4"/>
+          <p:cNvPicPr>
+            <a:picLocks noChangeAspect="1"/>
+          </p:cNvPicPr>
+          <p:nvPr/>
+        </p:nvPicPr>
+        <p:blipFill>
+          <a:blip r:embed="rId3" cstate="print">
+            <a:extLst>
+              <a:ext uri="{28A0092B-C50C-407E-A947-70E740481C1C}">
+                <a14:useLocalDpi xmlns:a14="http://schemas.microsoft.com/office/drawing/2010/main" val="0"/>
+              </a:ext>
+            </a:extLst>
+          </a:blip>
+          <a:stretch>
+            <a:fillRect/>
+          </a:stretch>
+        </p:blipFill>
+        <p:spPr>
+          <a:xfrm>
+            <a:off x="4688435" y="2199185"/>
+            <a:ext cx="4256045" cy="3192033"/>
           </a:xfrm>
           <a:prstGeom prst="rect">
             <a:avLst/>
           </a:prstGeom>
-          <a:noFill/>
-          <a:ln>
-            <a:noFill/>
-          </a:ln>
-          <a:effectLst/>
-          <a:extLst>
-            <a:ext uri="{909E8E84-426E-40DD-AFC4-6F175D3DCCD1}">
-              <a14:hiddenFill xmlns:a14="http://schemas.microsoft.com/office/drawing/2010/main">
-                <a:solidFill>
-                  <a:schemeClr val="accent1"/>
-                </a:solidFill>
-              </a14:hiddenFill>
-            </a:ext>
-            <a:ext uri="{91240B29-F687-4F45-9708-019B960494DF}">
-              <a14:hiddenLine xmlns:a14="http://schemas.microsoft.com/office/drawing/2010/main" w="9525">
-                <a:solidFill>
-                  <a:schemeClr val="tx1"/>
-                </a:solidFill>
-                <a:miter lim="800000"/>
-                <a:headEnd/>
-                <a:tailEnd/>
-              </a14:hiddenLine>
-            </a:ext>
-            <a:ext uri="{AF507438-7753-43E0-B8FC-AC1667EBCBE1}">
-              <a14:hiddenEffects xmlns:a14="http://schemas.microsoft.com/office/drawing/2010/main">
-                <a:effectLst>
-                  <a:outerShdw dist="35921" dir="2700000" algn="ctr" rotWithShape="0">
-                    <a:schemeClr val="bg2"/>
-                  </a:outerShdw>
-                </a:effectLst>
-              </a14:hiddenEffects>
-            </a:ext>
-          </a:extLst>
         </p:spPr>
       </p:pic>
     </p:spTree>
@@ -10463,13 +10412,131 @@
   <p:clrMapOvr>
     <a:masterClrMapping/>
   </p:clrMapOvr>
-  <p:timing>
-    <p:tnLst>
-      <p:par>
-        <p:cTn id="1" dur="indefinite" restart="never" nodeType="tmRoot"/>
-      </p:par>
-    </p:tnLst>
-  </p:timing>
+</p:sld>
+</file>
+
+<file path=ppt/slides/slide9.xml><?xml version="1.0" encoding="utf-8"?>
+<p:sld xmlns:a="http://schemas.openxmlformats.org/drawingml/2006/main" xmlns:r="http://schemas.openxmlformats.org/officeDocument/2006/relationships" xmlns:p="http://schemas.openxmlformats.org/presentationml/2006/main">
+  <p:cSld>
+    <p:spTree>
+      <p:nvGrpSpPr>
+        <p:cNvPr id="1" name=""/>
+        <p:cNvGrpSpPr/>
+        <p:nvPr/>
+      </p:nvGrpSpPr>
+      <p:grpSpPr>
+        <a:xfrm>
+          <a:off x="0" y="0"/>
+          <a:ext cx="0" cy="0"/>
+          <a:chOff x="0" y="0"/>
+          <a:chExt cx="0" cy="0"/>
+        </a:xfrm>
+      </p:grpSpPr>
+      <p:sp>
+        <p:nvSpPr>
+          <p:cNvPr id="2" name="Title 1"/>
+          <p:cNvSpPr>
+            <a:spLocks noGrp="1"/>
+          </p:cNvSpPr>
+          <p:nvPr>
+            <p:ph type="title"/>
+          </p:nvPr>
+        </p:nvSpPr>
+        <p:spPr/>
+        <p:txBody>
+          <a:bodyPr/>
+          <a:lstStyle/>
+          <a:p>
+            <a:r>
+              <a:rPr lang="en-US" dirty="0"/>
+              <a:t>Taxa de </a:t>
+            </a:r>
+            <a:r>
+              <a:rPr lang="en-US" dirty="0" err="1"/>
+              <a:t>erros</a:t>
+            </a:r>
+            <a:r>
+              <a:rPr lang="en-US" dirty="0"/>
+              <a:t> de bit (BER)</a:t>
+            </a:r>
+          </a:p>
+        </p:txBody>
+      </p:sp>
+      <p:sp>
+        <p:nvSpPr>
+          <p:cNvPr id="3" name="Content Placeholder 2"/>
+          <p:cNvSpPr>
+            <a:spLocks noGrp="1"/>
+          </p:cNvSpPr>
+          <p:nvPr>
+            <p:ph idx="1"/>
+          </p:nvPr>
+        </p:nvSpPr>
+        <p:spPr/>
+        <p:txBody>
+          <a:bodyPr anchor="ctr">
+            <a:normAutofit/>
+          </a:bodyPr>
+          <a:lstStyle/>
+          <a:p>
+            <a:pPr marL="0" indent="0">
+              <a:buNone/>
+            </a:pPr>
+            <a:r>
+              <a:rPr lang="de-DE" dirty="0">
+                <a:latin typeface="Consolas" panose="020B0609020204030204" pitchFamily="49" charset="0"/>
+              </a:rPr>
+              <a:t>BER_BPSK = 2.9246e-04</a:t>
+            </a:r>
+          </a:p>
+          <a:p>
+            <a:pPr marL="0" indent="0">
+              <a:buNone/>
+            </a:pPr>
+            <a:r>
+              <a:rPr lang="de-DE" dirty="0">
+                <a:latin typeface="Consolas" panose="020B0609020204030204" pitchFamily="49" charset="0"/>
+              </a:rPr>
+              <a:t>BER_QPSK = 0.0821</a:t>
+            </a:r>
+          </a:p>
+          <a:p>
+            <a:pPr marL="0" indent="0">
+              <a:buNone/>
+            </a:pPr>
+            <a:r>
+              <a:rPr lang="de-DE" dirty="0">
+                <a:latin typeface="Consolas" panose="020B0609020204030204" pitchFamily="49" charset="0"/>
+              </a:rPr>
+              <a:t>BER_16PSK = 0.2990</a:t>
+            </a:r>
+          </a:p>
+          <a:p>
+            <a:pPr marL="0" indent="0">
+              <a:buNone/>
+            </a:pPr>
+            <a:r>
+              <a:rPr lang="de-DE" dirty="0">
+                <a:latin typeface="Consolas" panose="020B0609020204030204" pitchFamily="49" charset="0"/>
+              </a:rPr>
+              <a:t>BER_QUAM = 0.0014</a:t>
+            </a:r>
+            <a:endParaRPr lang="en-US" dirty="0">
+              <a:latin typeface="Consolas" panose="020B0609020204030204" pitchFamily="49" charset="0"/>
+            </a:endParaRPr>
+          </a:p>
+        </p:txBody>
+      </p:sp>
+    </p:spTree>
+    <p:extLst>
+      <p:ext uri="{BB962C8B-B14F-4D97-AF65-F5344CB8AC3E}">
+        <p14:creationId xmlns:p14="http://schemas.microsoft.com/office/powerpoint/2010/main" val="639380504"/>
+      </p:ext>
+    </p:extLst>
+  </p:cSld>
+  <p:clrMapOvr>
+    <a:masterClrMapping/>
+  </p:clrMapOvr>
 </p:sld>
 </file>
 

</xml_diff>

<commit_message>
gerados gráficos no domínio do tempo e adicionados aos slides
</commit_message>
<xml_diff>
--- a/COMUNICAÇÕES DIGITAIS.pptx
+++ b/COMUNICAÇÕES DIGITAIS.pptx
@@ -14,7 +14,11 @@
     <p:sldId id="263" r:id="rId8"/>
     <p:sldId id="264" r:id="rId9"/>
     <p:sldId id="266" r:id="rId10"/>
-    <p:sldId id="267" r:id="rId11"/>
+    <p:sldId id="268" r:id="rId11"/>
+    <p:sldId id="269" r:id="rId12"/>
+    <p:sldId id="270" r:id="rId13"/>
+    <p:sldId id="271" r:id="rId14"/>
+    <p:sldId id="267" r:id="rId15"/>
   </p:sldIdLst>
   <p:sldSz cx="9144000" cy="6858000" type="screen4x3"/>
   <p:notesSz cx="6858000" cy="9144000"/>
@@ -9451,12 +9455,14 @@
         </p:nvSpPr>
         <p:spPr/>
         <p:txBody>
-          <a:bodyPr/>
+          <a:bodyPr>
+            <a:normAutofit fontScale="90000"/>
+          </a:bodyPr>
           <a:lstStyle/>
           <a:p>
             <a:r>
               <a:rPr lang="pt-BR" dirty="0"/>
-              <a:t>COMUNICAÇÕES DIGITAIS</a:t>
+              <a:t>SIMULAÇÃO DE ESQUEMAS DE MODULAÇÃO DIGITAL</a:t>
             </a:r>
           </a:p>
         </p:txBody>
@@ -9540,6 +9546,450 @@
       </p:grpSpPr>
       <p:sp>
         <p:nvSpPr>
+          <p:cNvPr id="2" name="Título 1"/>
+          <p:cNvSpPr>
+            <a:spLocks noGrp="1"/>
+          </p:cNvSpPr>
+          <p:nvPr>
+            <p:ph type="title"/>
+          </p:nvPr>
+        </p:nvSpPr>
+        <p:spPr/>
+        <p:txBody>
+          <a:bodyPr/>
+          <a:lstStyle/>
+          <a:p>
+            <a:r>
+              <a:rPr lang="pt-BR" dirty="0"/>
+              <a:t>Comparação BPSK</a:t>
+            </a:r>
+          </a:p>
+        </p:txBody>
+      </p:sp>
+      <p:pic>
+        <p:nvPicPr>
+          <p:cNvPr id="4" name="Content Placeholder 3"/>
+          <p:cNvPicPr>
+            <a:picLocks noGrp="1" noChangeAspect="1"/>
+          </p:cNvPicPr>
+          <p:nvPr>
+            <p:ph idx="1"/>
+          </p:nvPr>
+        </p:nvPicPr>
+        <p:blipFill>
+          <a:blip r:embed="rId2">
+            <a:extLst>
+              <a:ext uri="{28A0092B-C50C-407E-A947-70E740481C1C}">
+                <a14:useLocalDpi xmlns:a14="http://schemas.microsoft.com/office/drawing/2010/main" val="0"/>
+              </a:ext>
+            </a:extLst>
+          </a:blip>
+          <a:stretch>
+            <a:fillRect/>
+          </a:stretch>
+        </p:blipFill>
+        <p:spPr>
+          <a:xfrm>
+            <a:off x="179512" y="2656349"/>
+            <a:ext cx="4536504" cy="2303350"/>
+          </a:xfrm>
+        </p:spPr>
+      </p:pic>
+      <p:pic>
+        <p:nvPicPr>
+          <p:cNvPr id="3" name="Picture 2"/>
+          <p:cNvPicPr>
+            <a:picLocks noChangeAspect="1"/>
+          </p:cNvPicPr>
+          <p:nvPr/>
+        </p:nvPicPr>
+        <p:blipFill>
+          <a:blip r:embed="rId3" cstate="print">
+            <a:extLst>
+              <a:ext uri="{28A0092B-C50C-407E-A947-70E740481C1C}">
+                <a14:useLocalDpi xmlns:a14="http://schemas.microsoft.com/office/drawing/2010/main" val="0"/>
+              </a:ext>
+            </a:extLst>
+          </a:blip>
+          <a:stretch>
+            <a:fillRect/>
+          </a:stretch>
+        </p:blipFill>
+        <p:spPr>
+          <a:xfrm>
+            <a:off x="4860032" y="2204864"/>
+            <a:ext cx="4089346" cy="3067009"/>
+          </a:xfrm>
+          <a:prstGeom prst="rect">
+            <a:avLst/>
+          </a:prstGeom>
+        </p:spPr>
+      </p:pic>
+    </p:spTree>
+    <p:extLst>
+      <p:ext uri="{BB962C8B-B14F-4D97-AF65-F5344CB8AC3E}">
+        <p14:creationId xmlns:p14="http://schemas.microsoft.com/office/powerpoint/2010/main" val="1847472753"/>
+      </p:ext>
+    </p:extLst>
+  </p:cSld>
+  <p:clrMapOvr>
+    <a:masterClrMapping/>
+  </p:clrMapOvr>
+</p:sld>
+</file>
+
+<file path=ppt/slides/slide11.xml><?xml version="1.0" encoding="utf-8"?>
+<p:sld xmlns:a="http://schemas.openxmlformats.org/drawingml/2006/main" xmlns:r="http://schemas.openxmlformats.org/officeDocument/2006/relationships" xmlns:p="http://schemas.openxmlformats.org/presentationml/2006/main">
+  <p:cSld>
+    <p:spTree>
+      <p:nvGrpSpPr>
+        <p:cNvPr id="1" name=""/>
+        <p:cNvGrpSpPr/>
+        <p:nvPr/>
+      </p:nvGrpSpPr>
+      <p:grpSpPr>
+        <a:xfrm>
+          <a:off x="0" y="0"/>
+          <a:ext cx="0" cy="0"/>
+          <a:chOff x="0" y="0"/>
+          <a:chExt cx="0" cy="0"/>
+        </a:xfrm>
+      </p:grpSpPr>
+      <p:sp>
+        <p:nvSpPr>
+          <p:cNvPr id="2" name="Título 1"/>
+          <p:cNvSpPr>
+            <a:spLocks noGrp="1"/>
+          </p:cNvSpPr>
+          <p:nvPr>
+            <p:ph type="title"/>
+          </p:nvPr>
+        </p:nvSpPr>
+        <p:spPr/>
+        <p:txBody>
+          <a:bodyPr/>
+          <a:lstStyle/>
+          <a:p>
+            <a:r>
+              <a:rPr lang="pt-BR" dirty="0"/>
+              <a:t>Comparação QPSK</a:t>
+            </a:r>
+          </a:p>
+        </p:txBody>
+      </p:sp>
+      <p:pic>
+        <p:nvPicPr>
+          <p:cNvPr id="4" name="Content Placeholder 3"/>
+          <p:cNvPicPr>
+            <a:picLocks noGrp="1" noChangeAspect="1"/>
+          </p:cNvPicPr>
+          <p:nvPr>
+            <p:ph idx="1"/>
+          </p:nvPr>
+        </p:nvPicPr>
+        <p:blipFill>
+          <a:blip r:embed="rId2" cstate="print">
+            <a:extLst>
+              <a:ext uri="{28A0092B-C50C-407E-A947-70E740481C1C}">
+                <a14:useLocalDpi xmlns:a14="http://schemas.microsoft.com/office/drawing/2010/main" val="0"/>
+              </a:ext>
+            </a:extLst>
+          </a:blip>
+          <a:stretch>
+            <a:fillRect/>
+          </a:stretch>
+        </p:blipFill>
+        <p:spPr>
+          <a:xfrm>
+            <a:off x="251520" y="2492896"/>
+            <a:ext cx="4149322" cy="2106764"/>
+          </a:xfrm>
+        </p:spPr>
+      </p:pic>
+      <p:pic>
+        <p:nvPicPr>
+          <p:cNvPr id="3" name="Picture 2"/>
+          <p:cNvPicPr>
+            <a:picLocks noChangeAspect="1"/>
+          </p:cNvPicPr>
+          <p:nvPr/>
+        </p:nvPicPr>
+        <p:blipFill>
+          <a:blip r:embed="rId3" cstate="print">
+            <a:extLst>
+              <a:ext uri="{28A0092B-C50C-407E-A947-70E740481C1C}">
+                <a14:useLocalDpi xmlns:a14="http://schemas.microsoft.com/office/drawing/2010/main" val="0"/>
+              </a:ext>
+            </a:extLst>
+          </a:blip>
+          <a:stretch>
+            <a:fillRect/>
+          </a:stretch>
+        </p:blipFill>
+        <p:spPr>
+          <a:xfrm>
+            <a:off x="4499992" y="1916832"/>
+            <a:ext cx="4449386" cy="3337039"/>
+          </a:xfrm>
+          <a:prstGeom prst="rect">
+            <a:avLst/>
+          </a:prstGeom>
+        </p:spPr>
+      </p:pic>
+    </p:spTree>
+    <p:extLst>
+      <p:ext uri="{BB962C8B-B14F-4D97-AF65-F5344CB8AC3E}">
+        <p14:creationId xmlns:p14="http://schemas.microsoft.com/office/powerpoint/2010/main" val="46559223"/>
+      </p:ext>
+    </p:extLst>
+  </p:cSld>
+  <p:clrMapOvr>
+    <a:masterClrMapping/>
+  </p:clrMapOvr>
+</p:sld>
+</file>
+
+<file path=ppt/slides/slide12.xml><?xml version="1.0" encoding="utf-8"?>
+<p:sld xmlns:a="http://schemas.openxmlformats.org/drawingml/2006/main" xmlns:r="http://schemas.openxmlformats.org/officeDocument/2006/relationships" xmlns:p="http://schemas.openxmlformats.org/presentationml/2006/main">
+  <p:cSld>
+    <p:spTree>
+      <p:nvGrpSpPr>
+        <p:cNvPr id="1" name=""/>
+        <p:cNvGrpSpPr/>
+        <p:nvPr/>
+      </p:nvGrpSpPr>
+      <p:grpSpPr>
+        <a:xfrm>
+          <a:off x="0" y="0"/>
+          <a:ext cx="0" cy="0"/>
+          <a:chOff x="0" y="0"/>
+          <a:chExt cx="0" cy="0"/>
+        </a:xfrm>
+      </p:grpSpPr>
+      <p:sp>
+        <p:nvSpPr>
+          <p:cNvPr id="2" name="Título 1"/>
+          <p:cNvSpPr>
+            <a:spLocks noGrp="1"/>
+          </p:cNvSpPr>
+          <p:nvPr>
+            <p:ph type="title"/>
+          </p:nvPr>
+        </p:nvSpPr>
+        <p:spPr/>
+        <p:txBody>
+          <a:bodyPr/>
+          <a:lstStyle/>
+          <a:p>
+            <a:r>
+              <a:rPr lang="pt-BR" dirty="0"/>
+              <a:t>Comparação PSK 8 bits</a:t>
+            </a:r>
+          </a:p>
+        </p:txBody>
+      </p:sp>
+      <p:pic>
+        <p:nvPicPr>
+          <p:cNvPr id="4" name="Content Placeholder 3"/>
+          <p:cNvPicPr>
+            <a:picLocks noGrp="1" noChangeAspect="1"/>
+          </p:cNvPicPr>
+          <p:nvPr>
+            <p:ph idx="1"/>
+          </p:nvPr>
+        </p:nvPicPr>
+        <p:blipFill>
+          <a:blip r:embed="rId2" cstate="print">
+            <a:extLst>
+              <a:ext uri="{28A0092B-C50C-407E-A947-70E740481C1C}">
+                <a14:useLocalDpi xmlns:a14="http://schemas.microsoft.com/office/drawing/2010/main" val="0"/>
+              </a:ext>
+            </a:extLst>
+          </a:blip>
+          <a:stretch>
+            <a:fillRect/>
+          </a:stretch>
+        </p:blipFill>
+        <p:spPr>
+          <a:xfrm>
+            <a:off x="179511" y="2636912"/>
+            <a:ext cx="4108025" cy="2085796"/>
+          </a:xfrm>
+        </p:spPr>
+      </p:pic>
+      <p:pic>
+        <p:nvPicPr>
+          <p:cNvPr id="3" name="Picture 2"/>
+          <p:cNvPicPr>
+            <a:picLocks noChangeAspect="1"/>
+          </p:cNvPicPr>
+          <p:nvPr/>
+        </p:nvPicPr>
+        <p:blipFill>
+          <a:blip r:embed="rId3" cstate="print">
+            <a:extLst>
+              <a:ext uri="{28A0092B-C50C-407E-A947-70E740481C1C}">
+                <a14:useLocalDpi xmlns:a14="http://schemas.microsoft.com/office/drawing/2010/main" val="0"/>
+              </a:ext>
+            </a:extLst>
+          </a:blip>
+          <a:stretch>
+            <a:fillRect/>
+          </a:stretch>
+        </p:blipFill>
+        <p:spPr>
+          <a:xfrm>
+            <a:off x="4427984" y="1916832"/>
+            <a:ext cx="4529302" cy="3396976"/>
+          </a:xfrm>
+          <a:prstGeom prst="rect">
+            <a:avLst/>
+          </a:prstGeom>
+        </p:spPr>
+      </p:pic>
+    </p:spTree>
+    <p:extLst>
+      <p:ext uri="{BB962C8B-B14F-4D97-AF65-F5344CB8AC3E}">
+        <p14:creationId xmlns:p14="http://schemas.microsoft.com/office/powerpoint/2010/main" val="1992080211"/>
+      </p:ext>
+    </p:extLst>
+  </p:cSld>
+  <p:clrMapOvr>
+    <a:masterClrMapping/>
+  </p:clrMapOvr>
+</p:sld>
+</file>
+
+<file path=ppt/slides/slide13.xml><?xml version="1.0" encoding="utf-8"?>
+<p:sld xmlns:a="http://schemas.openxmlformats.org/drawingml/2006/main" xmlns:r="http://schemas.openxmlformats.org/officeDocument/2006/relationships" xmlns:p="http://schemas.openxmlformats.org/presentationml/2006/main">
+  <p:cSld>
+    <p:spTree>
+      <p:nvGrpSpPr>
+        <p:cNvPr id="1" name=""/>
+        <p:cNvGrpSpPr/>
+        <p:nvPr/>
+      </p:nvGrpSpPr>
+      <p:grpSpPr>
+        <a:xfrm>
+          <a:off x="0" y="0"/>
+          <a:ext cx="0" cy="0"/>
+          <a:chOff x="0" y="0"/>
+          <a:chExt cx="0" cy="0"/>
+        </a:xfrm>
+      </p:grpSpPr>
+      <p:sp>
+        <p:nvSpPr>
+          <p:cNvPr id="2" name="Título 1"/>
+          <p:cNvSpPr>
+            <a:spLocks noGrp="1"/>
+          </p:cNvSpPr>
+          <p:nvPr>
+            <p:ph type="title"/>
+          </p:nvPr>
+        </p:nvSpPr>
+        <p:spPr/>
+        <p:txBody>
+          <a:bodyPr/>
+          <a:lstStyle/>
+          <a:p>
+            <a:r>
+              <a:rPr lang="pt-BR" dirty="0"/>
+              <a:t>Comparação QAM 16 bits</a:t>
+            </a:r>
+          </a:p>
+        </p:txBody>
+      </p:sp>
+      <p:pic>
+        <p:nvPicPr>
+          <p:cNvPr id="4" name="Content Placeholder 3"/>
+          <p:cNvPicPr>
+            <a:picLocks noGrp="1" noChangeAspect="1"/>
+          </p:cNvPicPr>
+          <p:nvPr>
+            <p:ph idx="1"/>
+          </p:nvPr>
+        </p:nvPicPr>
+        <p:blipFill>
+          <a:blip r:embed="rId2" cstate="print">
+            <a:extLst>
+              <a:ext uri="{28A0092B-C50C-407E-A947-70E740481C1C}">
+                <a14:useLocalDpi xmlns:a14="http://schemas.microsoft.com/office/drawing/2010/main" val="0"/>
+              </a:ext>
+            </a:extLst>
+          </a:blip>
+          <a:stretch>
+            <a:fillRect/>
+          </a:stretch>
+        </p:blipFill>
+        <p:spPr>
+          <a:xfrm>
+            <a:off x="138624" y="2708920"/>
+            <a:ext cx="4042434" cy="2052493"/>
+          </a:xfrm>
+        </p:spPr>
+      </p:pic>
+      <p:pic>
+        <p:nvPicPr>
+          <p:cNvPr id="3" name="Picture 2"/>
+          <p:cNvPicPr>
+            <a:picLocks noChangeAspect="1"/>
+          </p:cNvPicPr>
+          <p:nvPr/>
+        </p:nvPicPr>
+        <p:blipFill>
+          <a:blip r:embed="rId3" cstate="print">
+            <a:extLst>
+              <a:ext uri="{28A0092B-C50C-407E-A947-70E740481C1C}">
+                <a14:useLocalDpi xmlns:a14="http://schemas.microsoft.com/office/drawing/2010/main" val="0"/>
+              </a:ext>
+            </a:extLst>
+          </a:blip>
+          <a:stretch>
+            <a:fillRect/>
+          </a:stretch>
+        </p:blipFill>
+        <p:spPr>
+          <a:xfrm>
+            <a:off x="4283968" y="2060848"/>
+            <a:ext cx="4680520" cy="3510390"/>
+          </a:xfrm>
+          <a:prstGeom prst="rect">
+            <a:avLst/>
+          </a:prstGeom>
+        </p:spPr>
+      </p:pic>
+    </p:spTree>
+    <p:extLst>
+      <p:ext uri="{BB962C8B-B14F-4D97-AF65-F5344CB8AC3E}">
+        <p14:creationId xmlns:p14="http://schemas.microsoft.com/office/powerpoint/2010/main" val="798514250"/>
+      </p:ext>
+    </p:extLst>
+  </p:cSld>
+  <p:clrMapOvr>
+    <a:masterClrMapping/>
+  </p:clrMapOvr>
+</p:sld>
+</file>
+
+<file path=ppt/slides/slide14.xml><?xml version="1.0" encoding="utf-8"?>
+<p:sld xmlns:a="http://schemas.openxmlformats.org/drawingml/2006/main" xmlns:r="http://schemas.openxmlformats.org/officeDocument/2006/relationships" xmlns:p="http://schemas.openxmlformats.org/presentationml/2006/main">
+  <p:cSld>
+    <p:spTree>
+      <p:nvGrpSpPr>
+        <p:cNvPr id="1" name=""/>
+        <p:cNvGrpSpPr/>
+        <p:nvPr/>
+      </p:nvGrpSpPr>
+      <p:grpSpPr>
+        <a:xfrm>
+          <a:off x="0" y="0"/>
+          <a:ext cx="0" cy="0"/>
+          <a:chOff x="0" y="0"/>
+          <a:chExt cx="0" cy="0"/>
+        </a:xfrm>
+      </p:grpSpPr>
+      <p:sp>
+        <p:nvSpPr>
           <p:cNvPr id="2" name="Title 1"/>
           <p:cNvSpPr>
             <a:spLocks noGrp="1"/>
@@ -9590,7 +10040,31 @@
             </a:pPr>
             <a:r>
               <a:rPr lang="en-US" dirty="0"/>
-              <a:t>BPSK</a:t>
+              <a:t>BPSK (</a:t>
+            </a:r>
+            <a:r>
+              <a:rPr lang="en-US" i="1" dirty="0" err="1"/>
+              <a:t>quase</a:t>
+            </a:r>
+            <a:r>
+              <a:rPr lang="en-US" i="1" dirty="0"/>
+              <a:t> </a:t>
+            </a:r>
+            <a:r>
+              <a:rPr lang="en-US" dirty="0" err="1"/>
+              <a:t>igual</a:t>
+            </a:r>
+            <a:r>
+              <a:rPr lang="en-US" dirty="0"/>
+              <a:t> </a:t>
+            </a:r>
+            <a:r>
+              <a:rPr lang="en-US" dirty="0" err="1"/>
+              <a:t>ao</a:t>
+            </a:r>
+            <a:r>
+              <a:rPr lang="en-US" dirty="0"/>
+              <a:t> original)</a:t>
             </a:r>
           </a:p>
           <a:p>
@@ -9703,7 +10177,7 @@
       </p:sp>
       <p:pic>
         <p:nvPicPr>
-          <p:cNvPr id="9" name="Content Placeholder 8"/>
+          <p:cNvPr id="4" name="Content Placeholder 3"/>
           <p:cNvPicPr>
             <a:picLocks noGrp="1" noChangeAspect="1"/>
           </p:cNvPicPr>
@@ -9725,8 +10199,8 @@
         </p:blipFill>
         <p:spPr>
           <a:xfrm>
-            <a:off x="502567" y="1862758"/>
-            <a:ext cx="8138865" cy="4000847"/>
+            <a:off x="632118" y="1862758"/>
+            <a:ext cx="7879763" cy="4000847"/>
           </a:xfrm>
         </p:spPr>
       </p:pic>

</xml_diff>